<commit_message>
Github Repository Link was changed in both documantation and ppt.
</commit_message>
<xml_diff>
--- a/Traffic Accident Patterns Analysis.pptx
+++ b/Traffic Accident Patterns Analysis.pptx
@@ -30,16 +30,17 @@
     <p:sldId id="275" r:id="rId26"/>
     <p:sldId id="276" r:id="rId27"/>
     <p:sldId id="277" r:id="rId28"/>
+    <p:sldId id="278" r:id="rId29"/>
   </p:sldIdLst>
   <p:sldSz cy="10287000" cx="18288000"/>
   <p:notesSz cx="6858000" cy="9144000"/>
   <p:embeddedFontLst>
     <p:embeddedFont>
       <p:font typeface="Montserrat"/>
-      <p:regular r:id="rId29"/>
-      <p:bold r:id="rId30"/>
-      <p:italic r:id="rId31"/>
-      <p:boldItalic r:id="rId32"/>
+      <p:regular r:id="rId30"/>
+      <p:bold r:id="rId31"/>
+      <p:italic r:id="rId32"/>
+      <p:boldItalic r:id="rId33"/>
     </p:embeddedFont>
   </p:embeddedFontLst>
   <p:defaultTextStyle>
@@ -2022,7 +2023,7 @@
       </p:grpSpPr>
       <p:sp>
         <p:nvSpPr>
-          <p:cNvPr id="434" name="Google Shape;434;p20:notes"/>
+          <p:cNvPr id="434" name="Google Shape;434;g36a7256ca7c_0_20:notes"/>
           <p:cNvSpPr txBox="1"/>
           <p:nvPr>
             <p:ph idx="1" type="body"/>
@@ -2061,7 +2062,106 @@
       </p:sp>
       <p:sp>
         <p:nvSpPr>
-          <p:cNvPr id="435" name="Google Shape;435;p20:notes"/>
+          <p:cNvPr id="435" name="Google Shape;435;g36a7256ca7c_0_20:notes"/>
+          <p:cNvSpPr/>
+          <p:nvPr>
+            <p:ph idx="2" type="sldImg"/>
+          </p:nvPr>
+        </p:nvSpPr>
+        <p:spPr>
+          <a:xfrm>
+            <a:off x="1143225" y="685800"/>
+            <a:ext cx="4572300" cy="3429000"/>
+          </a:xfrm>
+          <a:custGeom>
+            <a:rect b="b" l="l" r="r" t="t"/>
+            <a:pathLst>
+              <a:path extrusionOk="0" h="120000" w="120000">
+                <a:moveTo>
+                  <a:pt x="0" y="0"/>
+                </a:moveTo>
+                <a:lnTo>
+                  <a:pt x="120000" y="0"/>
+                </a:lnTo>
+                <a:lnTo>
+                  <a:pt x="120000" y="120000"/>
+                </a:lnTo>
+                <a:lnTo>
+                  <a:pt x="0" y="120000"/>
+                </a:lnTo>
+                <a:close/>
+              </a:path>
+            </a:pathLst>
+          </a:custGeom>
+        </p:spPr>
+      </p:sp>
+    </p:spTree>
+  </p:cSld>
+  <p:clrMapOvr>
+    <a:masterClrMapping/>
+  </p:clrMapOvr>
+</p:notes>
+</file>
+
+<file path=ppt/notesSlides/notesSlide22.xml><?xml version="1.0" encoding="utf-8"?>
+<p:notes xmlns:a="http://schemas.openxmlformats.org/drawingml/2006/main" xmlns:r="http://schemas.openxmlformats.org/officeDocument/2006/relationships" xmlns:mc="http://schemas.openxmlformats.org/markup-compatibility/2006" xmlns:mv="urn:schemas-microsoft-com:mac:vml" xmlns:p="http://schemas.openxmlformats.org/presentationml/2006/main" xmlns:c="http://schemas.openxmlformats.org/drawingml/2006/chart" xmlns:dgm="http://schemas.openxmlformats.org/drawingml/2006/diagram" xmlns:o="urn:schemas-microsoft-com:office:office" xmlns:v="urn:schemas-microsoft-com:vml" xmlns:pvml="urn:schemas-microsoft-com:office:powerpoint" xmlns:com="http://schemas.openxmlformats.org/drawingml/2006/compatibility" xmlns:p14="http://schemas.microsoft.com/office/powerpoint/2010/main" xmlns:p15="http://schemas.microsoft.com/office/powerpoint/2012/main" xmlns:ahyp="http://schemas.microsoft.com/office/drawing/2018/hyperlinkcolor" showMasterPhAnim="0" showMasterSp="0">
+  <p:cSld>
+    <p:spTree>
+      <p:nvGrpSpPr>
+        <p:cNvPr id="452" name="Shape 452"/>
+        <p:cNvGrpSpPr/>
+        <p:nvPr/>
+      </p:nvGrpSpPr>
+      <p:grpSpPr>
+        <a:xfrm>
+          <a:off x="0" y="0"/>
+          <a:ext cx="0" cy="0"/>
+          <a:chOff x="0" y="0"/>
+          <a:chExt cx="0" cy="0"/>
+        </a:xfrm>
+      </p:grpSpPr>
+      <p:sp>
+        <p:nvSpPr>
+          <p:cNvPr id="453" name="Google Shape;453;p20:notes"/>
+          <p:cNvSpPr txBox="1"/>
+          <p:nvPr>
+            <p:ph idx="1" type="body"/>
+          </p:nvPr>
+        </p:nvSpPr>
+        <p:spPr>
+          <a:xfrm>
+            <a:off x="685800" y="4343400"/>
+            <a:ext cx="5486400" cy="4114800"/>
+          </a:xfrm>
+          <a:prstGeom prst="rect">
+            <a:avLst/>
+          </a:prstGeom>
+        </p:spPr>
+        <p:txBody>
+          <a:bodyPr anchorCtr="0" anchor="t" bIns="91425" lIns="91425" spcFirstLastPara="1" rIns="91425" wrap="square" tIns="91425">
+            <a:noAutofit/>
+          </a:bodyPr>
+          <a:lstStyle/>
+          <a:p>
+            <a:pPr indent="0" lvl="0" marL="0" rtl="0" algn="l">
+              <a:spcBef>
+                <a:spcPts val="0"/>
+              </a:spcBef>
+              <a:spcAft>
+                <a:spcPts val="0"/>
+              </a:spcAft>
+              <a:buNone/>
+            </a:pPr>
+            <a:r>
+              <a:t/>
+            </a:r>
+            <a:endParaRPr/>
+          </a:p>
+        </p:txBody>
+      </p:sp>
+      <p:sp>
+        <p:nvSpPr>
+          <p:cNvPr id="454" name="Google Shape;454;p20:notes"/>
           <p:cNvSpPr/>
           <p:nvPr>
             <p:ph idx="2" type="sldImg"/>
@@ -2102,12 +2202,12 @@
 </p:notes>
 </file>
 
-<file path=ppt/notesSlides/notesSlide22.xml><?xml version="1.0" encoding="utf-8"?>
+<file path=ppt/notesSlides/notesSlide23.xml><?xml version="1.0" encoding="utf-8"?>
 <p:notes xmlns:a="http://schemas.openxmlformats.org/drawingml/2006/main" xmlns:r="http://schemas.openxmlformats.org/officeDocument/2006/relationships" xmlns:mc="http://schemas.openxmlformats.org/markup-compatibility/2006" xmlns:mv="urn:schemas-microsoft-com:mac:vml" xmlns:p="http://schemas.openxmlformats.org/presentationml/2006/main" xmlns:c="http://schemas.openxmlformats.org/drawingml/2006/chart" xmlns:dgm="http://schemas.openxmlformats.org/drawingml/2006/diagram" xmlns:o="urn:schemas-microsoft-com:office:office" xmlns:v="urn:schemas-microsoft-com:vml" xmlns:pvml="urn:schemas-microsoft-com:office:powerpoint" xmlns:com="http://schemas.openxmlformats.org/drawingml/2006/compatibility" xmlns:p14="http://schemas.microsoft.com/office/powerpoint/2010/main" xmlns:p15="http://schemas.microsoft.com/office/powerpoint/2012/main" xmlns:ahyp="http://schemas.microsoft.com/office/drawing/2018/hyperlinkcolor" showMasterPhAnim="0" showMasterSp="0">
   <p:cSld>
     <p:spTree>
       <p:nvGrpSpPr>
-        <p:cNvPr id="445" name="Shape 445"/>
+        <p:cNvPr id="464" name="Shape 464"/>
         <p:cNvGrpSpPr/>
         <p:nvPr/>
       </p:nvGrpSpPr>
@@ -2121,7 +2221,7 @@
       </p:grpSpPr>
       <p:sp>
         <p:nvSpPr>
-          <p:cNvPr id="446" name="Google Shape;446;p21:notes"/>
+          <p:cNvPr id="465" name="Google Shape;465;p21:notes"/>
           <p:cNvSpPr txBox="1"/>
           <p:nvPr>
             <p:ph idx="1" type="body"/>
@@ -2160,7 +2260,7 @@
       </p:sp>
       <p:sp>
         <p:nvSpPr>
-          <p:cNvPr id="447" name="Google Shape;447;p21:notes"/>
+          <p:cNvPr id="466" name="Google Shape;466;p21:notes"/>
           <p:cNvSpPr/>
           <p:nvPr>
             <p:ph idx="2" type="sldImg"/>
@@ -20391,7 +20491,7 @@
             <a:tbl>
               <a:tblPr bandRow="1" firstRow="1">
                 <a:noFill/>
-                <a:tableStyleId>{C37B463D-986B-4CE5-95D7-F6BDEEE31055}</a:tableStyleId>
+                <a:tableStyleId>{747BC926-9306-403B-A0F3-CF0286495B7A}</a:tableStyleId>
               </a:tblPr>
               <a:tblGrid>
                 <a:gridCol w="5791200"/>
@@ -20824,7 +20924,7 @@
             <a:tbl>
               <a:tblPr bandRow="1" firstRow="1">
                 <a:noFill/>
-                <a:tableStyleId>{C37B463D-986B-4CE5-95D7-F6BDEEE31055}</a:tableStyleId>
+                <a:tableStyleId>{747BC926-9306-403B-A0F3-CF0286495B7A}</a:tableStyleId>
               </a:tblPr>
               <a:tblGrid>
                 <a:gridCol w="6096000"/>
@@ -21223,7 +21323,7 @@
             <a:tbl>
               <a:tblPr bandRow="1" firstRow="1">
                 <a:noFill/>
-                <a:tableStyleId>{C37B463D-986B-4CE5-95D7-F6BDEEE31055}</a:tableStyleId>
+                <a:tableStyleId>{747BC926-9306-403B-A0F3-CF0286495B7A}</a:tableStyleId>
               </a:tblPr>
               <a:tblGrid>
                 <a:gridCol w="5791200"/>
@@ -24233,8 +24333,8 @@
         </p:nvSpPr>
         <p:spPr>
           <a:xfrm>
-            <a:off x="2300325" y="3081775"/>
-            <a:ext cx="8764500" cy="5375100"/>
+            <a:off x="2169850" y="3081775"/>
+            <a:ext cx="8764500" cy="5684400"/>
           </a:xfrm>
           <a:prstGeom prst="rect">
             <a:avLst/>
@@ -24250,7 +24350,7 @@
           </a:bodyPr>
           <a:lstStyle/>
           <a:p>
-            <a:pPr indent="-336550" lvl="0" marL="457200" rtl="0" algn="l">
+            <a:pPr indent="-368300" lvl="0" marL="457200" rtl="0" algn="l">
               <a:lnSpc>
                 <a:spcPct val="107916"/>
               </a:lnSpc>
@@ -24263,12 +24363,12 @@
               <a:buClr>
                 <a:schemeClr val="dk1"/>
               </a:buClr>
-              <a:buSzPts val="1700"/>
+              <a:buSzPts val="2200"/>
               <a:buFont typeface="Times New Roman"/>
               <a:buChar char="●"/>
             </a:pPr>
             <a:r>
-              <a:rPr lang="en-US" sz="1700">
+              <a:rPr lang="en-US" sz="2200">
                 <a:solidFill>
                   <a:schemeClr val="dk1"/>
                 </a:solidFill>
@@ -24279,7 +24379,7 @@
               </a:rPr>
               <a:t>Pandas Documentation</a:t>
             </a:r>
-            <a:endParaRPr sz="1700">
+            <a:endParaRPr sz="2200">
               <a:solidFill>
                 <a:schemeClr val="dk1"/>
               </a:solidFill>
@@ -24303,7 +24403,7 @@
               <a:buNone/>
             </a:pPr>
             <a:r>
-              <a:rPr lang="en-US" sz="1700">
+              <a:rPr lang="en-US" sz="2200">
                 <a:solidFill>
                   <a:schemeClr val="dk1"/>
                 </a:solidFill>
@@ -24315,7 +24415,7 @@
               <a:t>          </a:t>
             </a:r>
             <a:r>
-              <a:rPr lang="en-US" sz="1700" u="sng">
+              <a:rPr lang="en-US" sz="2200" u="sng">
                 <a:solidFill>
                   <a:srgbClr val="1155CC"/>
                 </a:solidFill>
@@ -24333,7 +24433,7 @@
               </a:rPr>
               <a:t>https://pandas.pydata.org/docs/</a:t>
             </a:r>
-            <a:endParaRPr sz="1700">
+            <a:endParaRPr sz="2200">
               <a:solidFill>
                 <a:schemeClr val="dk1"/>
               </a:solidFill>
@@ -24359,7 +24459,7 @@
             <a:r>
               <a:t/>
             </a:r>
-            <a:endParaRPr sz="1700">
+            <a:endParaRPr sz="2200">
               <a:solidFill>
                 <a:schemeClr val="dk1"/>
               </a:solidFill>
@@ -24370,7 +24470,7 @@
             </a:endParaRPr>
           </a:p>
           <a:p>
-            <a:pPr indent="-336550" lvl="0" marL="457200" rtl="0" algn="l">
+            <a:pPr indent="-368300" lvl="0" marL="457200" rtl="0" algn="l">
               <a:lnSpc>
                 <a:spcPct val="107916"/>
               </a:lnSpc>
@@ -24383,12 +24483,12 @@
               <a:buClr>
                 <a:schemeClr val="dk1"/>
               </a:buClr>
-              <a:buSzPts val="1700"/>
+              <a:buSzPts val="2200"/>
               <a:buFont typeface="Times New Roman"/>
               <a:buChar char="●"/>
             </a:pPr>
             <a:r>
-              <a:rPr lang="en-US" sz="1700">
+              <a:rPr lang="en-US" sz="2200">
                 <a:solidFill>
                   <a:schemeClr val="dk1"/>
                 </a:solidFill>
@@ -24399,7 +24499,7 @@
               </a:rPr>
               <a:t>NumPy Documentation</a:t>
             </a:r>
-            <a:endParaRPr sz="1700">
+            <a:endParaRPr sz="2200">
               <a:solidFill>
                 <a:schemeClr val="dk1"/>
               </a:solidFill>
@@ -24423,7 +24523,7 @@
               <a:buNone/>
             </a:pPr>
             <a:r>
-              <a:rPr lang="en-US" sz="1700" u="sng">
+              <a:rPr lang="en-US" sz="2200" u="sng">
                 <a:solidFill>
                   <a:srgbClr val="1155CC"/>
                 </a:solidFill>
@@ -24441,7 +24541,7 @@
               </a:rPr>
               <a:t>https://numpy.org/doc/</a:t>
             </a:r>
-            <a:endParaRPr sz="1700">
+            <a:endParaRPr sz="2200">
               <a:solidFill>
                 <a:schemeClr val="dk1"/>
               </a:solidFill>
@@ -24467,7 +24567,7 @@
             <a:r>
               <a:t/>
             </a:r>
-            <a:endParaRPr sz="1700">
+            <a:endParaRPr sz="2200">
               <a:solidFill>
                 <a:schemeClr val="dk1"/>
               </a:solidFill>
@@ -24478,7 +24578,7 @@
             </a:endParaRPr>
           </a:p>
           <a:p>
-            <a:pPr indent="-336550" lvl="0" marL="457200" rtl="0" algn="l">
+            <a:pPr indent="-368300" lvl="0" marL="457200" rtl="0" algn="l">
               <a:lnSpc>
                 <a:spcPct val="107916"/>
               </a:lnSpc>
@@ -24491,12 +24591,12 @@
               <a:buClr>
                 <a:schemeClr val="dk1"/>
               </a:buClr>
-              <a:buSzPts val="1700"/>
+              <a:buSzPts val="2200"/>
               <a:buFont typeface="Times New Roman"/>
               <a:buChar char="●"/>
             </a:pPr>
             <a:r>
-              <a:rPr lang="en-US" sz="1700">
+              <a:rPr lang="en-US" sz="2200">
                 <a:solidFill>
                   <a:schemeClr val="dk1"/>
                 </a:solidFill>
@@ -24507,7 +24607,7 @@
               </a:rPr>
               <a:t>Matplotlib Documentation</a:t>
             </a:r>
-            <a:endParaRPr sz="1700">
+            <a:endParaRPr sz="2200">
               <a:solidFill>
                 <a:schemeClr val="dk1"/>
               </a:solidFill>
@@ -24531,7 +24631,7 @@
               <a:buNone/>
             </a:pPr>
             <a:r>
-              <a:rPr lang="en-US" sz="1700" u="sng">
+              <a:rPr lang="en-US" sz="2200" u="sng">
                 <a:solidFill>
                   <a:srgbClr val="1155CC"/>
                 </a:solidFill>
@@ -24549,7 +24649,7 @@
               </a:rPr>
               <a:t>https://matplotlib.org/stable/contents.html</a:t>
             </a:r>
-            <a:endParaRPr sz="1700">
+            <a:endParaRPr sz="2200">
               <a:solidFill>
                 <a:schemeClr val="dk1"/>
               </a:solidFill>
@@ -24575,7 +24675,7 @@
             <a:r>
               <a:t/>
             </a:r>
-            <a:endParaRPr sz="1700">
+            <a:endParaRPr sz="2200">
               <a:solidFill>
                 <a:schemeClr val="dk1"/>
               </a:solidFill>
@@ -24586,7 +24686,7 @@
             </a:endParaRPr>
           </a:p>
           <a:p>
-            <a:pPr indent="-336550" lvl="0" marL="457200" rtl="0" algn="l">
+            <a:pPr indent="-368300" lvl="0" marL="457200" rtl="0" algn="l">
               <a:lnSpc>
                 <a:spcPct val="107916"/>
               </a:lnSpc>
@@ -24599,12 +24699,12 @@
               <a:buClr>
                 <a:schemeClr val="dk1"/>
               </a:buClr>
-              <a:buSzPts val="1700"/>
+              <a:buSzPts val="2200"/>
               <a:buFont typeface="Times New Roman"/>
               <a:buChar char="●"/>
             </a:pPr>
             <a:r>
-              <a:rPr lang="en-US" sz="1700">
+              <a:rPr lang="en-US" sz="2200">
                 <a:solidFill>
                   <a:schemeClr val="dk1"/>
                 </a:solidFill>
@@ -24615,7 +24715,7 @@
               </a:rPr>
               <a:t> Seaborn Documentation</a:t>
             </a:r>
-            <a:endParaRPr sz="1700">
+            <a:endParaRPr sz="2200">
               <a:solidFill>
                 <a:schemeClr val="dk1"/>
               </a:solidFill>
@@ -24639,7 +24739,7 @@
               <a:buNone/>
             </a:pPr>
             <a:r>
-              <a:rPr lang="en-US" sz="1700">
+              <a:rPr lang="en-US" sz="2200">
                 <a:solidFill>
                   <a:schemeClr val="dk1"/>
                 </a:solidFill>
@@ -24651,7 +24751,7 @@
               <a:t>           </a:t>
             </a:r>
             <a:r>
-              <a:rPr lang="en-US" sz="1700" u="sng">
+              <a:rPr lang="en-US" sz="2200" u="sng">
                 <a:solidFill>
                   <a:srgbClr val="1155CC"/>
                 </a:solidFill>
@@ -24669,7 +24769,7 @@
               </a:rPr>
               <a:t>https://seaborn.pydata.org/</a:t>
             </a:r>
-            <a:endParaRPr sz="1700">
+            <a:endParaRPr sz="2200">
               <a:solidFill>
                 <a:schemeClr val="dk1"/>
               </a:solidFill>
@@ -24695,7 +24795,7 @@
             <a:r>
               <a:t/>
             </a:r>
-            <a:endParaRPr sz="1700">
+            <a:endParaRPr sz="2200">
               <a:solidFill>
                 <a:schemeClr val="dk1"/>
               </a:solidFill>
@@ -24706,7 +24806,7 @@
             </a:endParaRPr>
           </a:p>
           <a:p>
-            <a:pPr indent="-336550" lvl="0" marL="457200" rtl="0" algn="l">
+            <a:pPr indent="-368300" lvl="0" marL="457200" rtl="0" algn="l">
               <a:lnSpc>
                 <a:spcPct val="107916"/>
               </a:lnSpc>
@@ -24719,12 +24819,12 @@
               <a:buClr>
                 <a:schemeClr val="dk1"/>
               </a:buClr>
-              <a:buSzPts val="1700"/>
+              <a:buSzPts val="2200"/>
               <a:buFont typeface="Times New Roman"/>
               <a:buChar char="●"/>
             </a:pPr>
             <a:r>
-              <a:rPr lang="en-US" sz="1700">
+              <a:rPr lang="en-US" sz="2200">
                 <a:solidFill>
                   <a:schemeClr val="dk1"/>
                 </a:solidFill>
@@ -24735,7 +24835,7 @@
               </a:rPr>
               <a:t>Python Official Documentation</a:t>
             </a:r>
-            <a:endParaRPr sz="1700">
+            <a:endParaRPr sz="2200">
               <a:solidFill>
                 <a:schemeClr val="dk1"/>
               </a:solidFill>
@@ -24759,7 +24859,7 @@
               <a:buNone/>
             </a:pPr>
             <a:r>
-              <a:rPr lang="en-US" sz="1700">
+              <a:rPr lang="en-US" sz="2200">
                 <a:solidFill>
                   <a:schemeClr val="dk1"/>
                 </a:solidFill>
@@ -24771,7 +24871,7 @@
               <a:t>         </a:t>
             </a:r>
             <a:r>
-              <a:rPr lang="en-US" sz="1700" u="sng">
+              <a:rPr lang="en-US" sz="2200" u="sng">
                 <a:solidFill>
                   <a:srgbClr val="1155CC"/>
                 </a:solidFill>
@@ -24789,146 +24889,7 @@
               </a:rPr>
               <a:t> https://docs.python.org/3/</a:t>
             </a:r>
-            <a:endParaRPr sz="1700">
-              <a:solidFill>
-                <a:schemeClr val="dk1"/>
-              </a:solidFill>
-              <a:latin typeface="Times New Roman"/>
-              <a:ea typeface="Times New Roman"/>
-              <a:cs typeface="Times New Roman"/>
-              <a:sym typeface="Times New Roman"/>
-            </a:endParaRPr>
-          </a:p>
-          <a:p>
-            <a:pPr indent="0" lvl="0" marL="0" rtl="0" algn="l">
-              <a:lnSpc>
-                <a:spcPct val="107916"/>
-              </a:lnSpc>
-              <a:spcBef>
-                <a:spcPts val="0"/>
-              </a:spcBef>
-              <a:spcAft>
-                <a:spcPts val="0"/>
-              </a:spcAft>
-              <a:buNone/>
-            </a:pPr>
-            <a:r>
-              <a:t/>
-            </a:r>
-            <a:endParaRPr sz="1700">
-              <a:solidFill>
-                <a:schemeClr val="dk1"/>
-              </a:solidFill>
-              <a:latin typeface="Times New Roman"/>
-              <a:ea typeface="Times New Roman"/>
-              <a:cs typeface="Times New Roman"/>
-              <a:sym typeface="Times New Roman"/>
-            </a:endParaRPr>
-          </a:p>
-          <a:p>
-            <a:pPr indent="-336550" lvl="0" marL="457200" rtl="0" algn="l">
-              <a:lnSpc>
-                <a:spcPct val="107916"/>
-              </a:lnSpc>
-              <a:spcBef>
-                <a:spcPts val="0"/>
-              </a:spcBef>
-              <a:spcAft>
-                <a:spcPts val="0"/>
-              </a:spcAft>
-              <a:buClr>
-                <a:schemeClr val="dk1"/>
-              </a:buClr>
-              <a:buSzPts val="1700"/>
-              <a:buFont typeface="Times New Roman"/>
-              <a:buChar char="●"/>
-            </a:pPr>
-            <a:r>
-              <a:rPr lang="en-US" sz="1700">
-                <a:solidFill>
-                  <a:schemeClr val="dk1"/>
-                </a:solidFill>
-                <a:latin typeface="Times New Roman"/>
-                <a:ea typeface="Times New Roman"/>
-                <a:cs typeface="Times New Roman"/>
-                <a:sym typeface="Times New Roman"/>
-              </a:rPr>
-              <a:t>Traffic Accident Dataset Source (if from Kaggle or any public dataset)</a:t>
-            </a:r>
-            <a:endParaRPr sz="1700">
-              <a:solidFill>
-                <a:schemeClr val="dk1"/>
-              </a:solidFill>
-              <a:latin typeface="Times New Roman"/>
-              <a:ea typeface="Times New Roman"/>
-              <a:cs typeface="Times New Roman"/>
-              <a:sym typeface="Times New Roman"/>
-            </a:endParaRPr>
-          </a:p>
-          <a:p>
-            <a:pPr indent="0" lvl="0" marL="0" rtl="0" algn="l">
-              <a:lnSpc>
-                <a:spcPct val="107916"/>
-              </a:lnSpc>
-              <a:spcBef>
-                <a:spcPts val="0"/>
-              </a:spcBef>
-              <a:spcAft>
-                <a:spcPts val="0"/>
-              </a:spcAft>
-              <a:buNone/>
-            </a:pPr>
-            <a:r>
-              <a:rPr lang="en-US" sz="1700">
-                <a:solidFill>
-                  <a:schemeClr val="dk1"/>
-                </a:solidFill>
-                <a:latin typeface="Times New Roman"/>
-                <a:ea typeface="Times New Roman"/>
-                <a:cs typeface="Times New Roman"/>
-                <a:sym typeface="Times New Roman"/>
-              </a:rPr>
-              <a:t>           </a:t>
-            </a:r>
-            <a:r>
-              <a:rPr lang="en-US" sz="1700" u="sng">
-                <a:solidFill>
-                  <a:srgbClr val="1155CC"/>
-                </a:solidFill>
-                <a:latin typeface="Times New Roman"/>
-                <a:ea typeface="Times New Roman"/>
-                <a:cs typeface="Times New Roman"/>
-                <a:sym typeface="Times New Roman"/>
-                <a:hlinkClick r:id="rId10">
-                  <a:extLst>
-                    <a:ext uri="{A12FA001-AC4F-418D-AE19-62706E023703}">
-                      <ahyp:hlinkClr val="tx"/>
-                    </a:ext>
-                  </a:extLst>
-                </a:hlinkClick>
-              </a:rPr>
-              <a:t>https://www.kaggle.com/datasets/adilshamim8/globa</a:t>
-            </a:r>
-            <a:r>
-              <a:rPr lang="en-US" sz="1700" u="sng">
-                <a:solidFill>
-                  <a:srgbClr val="1155CC"/>
-                </a:solidFill>
-                <a:latin typeface="Times New Roman"/>
-                <a:ea typeface="Times New Roman"/>
-                <a:cs typeface="Times New Roman"/>
-                <a:sym typeface="Times New Roman"/>
-                <a:hlinkClick r:id="rId11">
-                  <a:extLst>
-                    <a:ext uri="{A12FA001-AC4F-418D-AE19-62706E023703}">
-                      <ahyp:hlinkClr val="tx"/>
-                    </a:ext>
-                  </a:extLst>
-                </a:hlinkClick>
-              </a:rPr>
-              <a:t>l-traffic-accidents-dataset</a:t>
-            </a:r>
-            <a:endParaRPr sz="1700"/>
+            <a:endParaRPr sz="2200"/>
           </a:p>
         </p:txBody>
       </p:sp>
@@ -24946,7 +24907,7 @@
     <p:bg>
       <p:bgPr>
         <a:solidFill>
-          <a:srgbClr val="2B2B2B"/>
+          <a:srgbClr val="E4E2DD"/>
         </a:solidFill>
       </p:bgPr>
     </p:bg>
@@ -24964,9 +24925,1209 @@
           <a:chExt cx="0" cy="0"/>
         </a:xfrm>
       </p:grpSpPr>
+      <p:grpSp>
+        <p:nvGrpSpPr>
+          <p:cNvPr id="437" name="Google Shape;437;p33"/>
+          <p:cNvGrpSpPr/>
+          <p:nvPr/>
+        </p:nvGrpSpPr>
+        <p:grpSpPr>
+          <a:xfrm>
+            <a:off x="518950" y="2600494"/>
+            <a:ext cx="15910267" cy="6680754"/>
+            <a:chOff x="0" y="-241102"/>
+            <a:chExt cx="21213690" cy="8907673"/>
+          </a:xfrm>
+        </p:grpSpPr>
+        <p:grpSp>
+          <p:nvGrpSpPr>
+            <p:cNvPr id="438" name="Google Shape;438;p33"/>
+            <p:cNvGrpSpPr/>
+            <p:nvPr/>
+          </p:nvGrpSpPr>
+          <p:grpSpPr>
+            <a:xfrm>
+              <a:off x="1187452" y="507633"/>
+              <a:ext cx="20026238" cy="8158938"/>
+              <a:chOff x="0" y="-47625"/>
+              <a:chExt cx="3955800" cy="1611642"/>
+            </a:xfrm>
+          </p:grpSpPr>
+          <p:sp>
+            <p:nvSpPr>
+              <p:cNvPr id="439" name="Google Shape;439;p33"/>
+              <p:cNvSpPr/>
+              <p:nvPr/>
+            </p:nvSpPr>
+            <p:spPr>
+              <a:xfrm>
+                <a:off x="0" y="0"/>
+                <a:ext cx="3955729" cy="1564017"/>
+              </a:xfrm>
+              <a:custGeom>
+                <a:rect b="b" l="l" r="r" t="t"/>
+                <a:pathLst>
+                  <a:path extrusionOk="0" h="1564017" w="3955729">
+                    <a:moveTo>
+                      <a:pt x="26289" y="0"/>
+                    </a:moveTo>
+                    <a:lnTo>
+                      <a:pt x="3929440" y="0"/>
+                    </a:lnTo>
+                    <a:cubicBezTo>
+                      <a:pt x="3943959" y="0"/>
+                      <a:pt x="3955729" y="11770"/>
+                      <a:pt x="3955729" y="26289"/>
+                    </a:cubicBezTo>
+                    <a:lnTo>
+                      <a:pt x="3955729" y="1537728"/>
+                    </a:lnTo>
+                    <a:cubicBezTo>
+                      <a:pt x="3955729" y="1552247"/>
+                      <a:pt x="3943959" y="1564017"/>
+                      <a:pt x="3929440" y="1564017"/>
+                    </a:cubicBezTo>
+                    <a:lnTo>
+                      <a:pt x="26289" y="1564017"/>
+                    </a:lnTo>
+                    <a:cubicBezTo>
+                      <a:pt x="11770" y="1564017"/>
+                      <a:pt x="0" y="1552247"/>
+                      <a:pt x="0" y="1537728"/>
+                    </a:cubicBezTo>
+                    <a:lnTo>
+                      <a:pt x="0" y="26289"/>
+                    </a:lnTo>
+                    <a:cubicBezTo>
+                      <a:pt x="0" y="11770"/>
+                      <a:pt x="11770" y="0"/>
+                      <a:pt x="26289" y="0"/>
+                    </a:cubicBezTo>
+                    <a:close/>
+                  </a:path>
+                </a:pathLst>
+              </a:custGeom>
+              <a:solidFill>
+                <a:srgbClr val="2B2B2B"/>
+              </a:solidFill>
+              <a:ln>
+                <a:noFill/>
+              </a:ln>
+            </p:spPr>
+            <p:txBody>
+              <a:bodyPr anchorCtr="0" anchor="t" bIns="45700" lIns="91425" spcFirstLastPara="1" rIns="91425" wrap="square" tIns="45700">
+                <a:noAutofit/>
+              </a:bodyPr>
+              <a:lstStyle/>
+              <a:p>
+                <a:pPr indent="0" lvl="0" marL="0" marR="0" rtl="0" algn="l">
+                  <a:spcBef>
+                    <a:spcPts val="0"/>
+                  </a:spcBef>
+                  <a:spcAft>
+                    <a:spcPts val="0"/>
+                  </a:spcAft>
+                  <a:buNone/>
+                </a:pPr>
+                <a:r>
+                  <a:t/>
+                </a:r>
+                <a:endParaRPr sz="1800">
+                  <a:solidFill>
+                    <a:schemeClr val="dk1"/>
+                  </a:solidFill>
+                  <a:latin typeface="Calibri"/>
+                  <a:ea typeface="Calibri"/>
+                  <a:cs typeface="Calibri"/>
+                  <a:sym typeface="Calibri"/>
+                </a:endParaRPr>
+              </a:p>
+            </p:txBody>
+          </p:sp>
+          <p:sp>
+            <p:nvSpPr>
+              <p:cNvPr id="440" name="Google Shape;440;p33"/>
+              <p:cNvSpPr txBox="1"/>
+              <p:nvPr/>
+            </p:nvSpPr>
+            <p:spPr>
+              <a:xfrm>
+                <a:off x="0" y="-47625"/>
+                <a:ext cx="3955800" cy="1611600"/>
+              </a:xfrm>
+              <a:prstGeom prst="rect">
+                <a:avLst/>
+              </a:prstGeom>
+              <a:noFill/>
+              <a:ln>
+                <a:noFill/>
+              </a:ln>
+            </p:spPr>
+            <p:txBody>
+              <a:bodyPr anchorCtr="0" anchor="ctr" bIns="50800" lIns="50800" spcFirstLastPara="1" rIns="50800" wrap="square" tIns="50800">
+                <a:noAutofit/>
+              </a:bodyPr>
+              <a:lstStyle/>
+              <a:p>
+                <a:pPr indent="0" lvl="0" marL="0" marR="0" rtl="0" algn="ctr">
+                  <a:lnSpc>
+                    <a:spcPct val="147722"/>
+                  </a:lnSpc>
+                  <a:spcBef>
+                    <a:spcPts val="0"/>
+                  </a:spcBef>
+                  <a:spcAft>
+                    <a:spcPts val="0"/>
+                  </a:spcAft>
+                  <a:buNone/>
+                </a:pPr>
+                <a:r>
+                  <a:t/>
+                </a:r>
+                <a:endParaRPr sz="1800">
+                  <a:solidFill>
+                    <a:schemeClr val="dk1"/>
+                  </a:solidFill>
+                  <a:latin typeface="Calibri"/>
+                  <a:ea typeface="Calibri"/>
+                  <a:cs typeface="Calibri"/>
+                  <a:sym typeface="Calibri"/>
+                </a:endParaRPr>
+              </a:p>
+            </p:txBody>
+          </p:sp>
+        </p:grpSp>
+        <p:grpSp>
+          <p:nvGrpSpPr>
+            <p:cNvPr id="441" name="Google Shape;441;p33"/>
+            <p:cNvGrpSpPr/>
+            <p:nvPr/>
+          </p:nvGrpSpPr>
+          <p:grpSpPr>
+            <a:xfrm>
+              <a:off x="0" y="-241102"/>
+              <a:ext cx="20026238" cy="8158938"/>
+              <a:chOff x="0" y="-47625"/>
+              <a:chExt cx="3955800" cy="1611642"/>
+            </a:xfrm>
+          </p:grpSpPr>
+          <p:sp>
+            <p:nvSpPr>
+              <p:cNvPr id="442" name="Google Shape;442;p33"/>
+              <p:cNvSpPr/>
+              <p:nvPr/>
+            </p:nvSpPr>
+            <p:spPr>
+              <a:xfrm>
+                <a:off x="0" y="0"/>
+                <a:ext cx="3955729" cy="1564017"/>
+              </a:xfrm>
+              <a:custGeom>
+                <a:rect b="b" l="l" r="r" t="t"/>
+                <a:pathLst>
+                  <a:path extrusionOk="0" h="1564017" w="3955729">
+                    <a:moveTo>
+                      <a:pt x="26289" y="0"/>
+                    </a:moveTo>
+                    <a:lnTo>
+                      <a:pt x="3929440" y="0"/>
+                    </a:lnTo>
+                    <a:cubicBezTo>
+                      <a:pt x="3943959" y="0"/>
+                      <a:pt x="3955729" y="11770"/>
+                      <a:pt x="3955729" y="26289"/>
+                    </a:cubicBezTo>
+                    <a:lnTo>
+                      <a:pt x="3955729" y="1537728"/>
+                    </a:lnTo>
+                    <a:cubicBezTo>
+                      <a:pt x="3955729" y="1552247"/>
+                      <a:pt x="3943959" y="1564017"/>
+                      <a:pt x="3929440" y="1564017"/>
+                    </a:cubicBezTo>
+                    <a:lnTo>
+                      <a:pt x="26289" y="1564017"/>
+                    </a:lnTo>
+                    <a:cubicBezTo>
+                      <a:pt x="11770" y="1564017"/>
+                      <a:pt x="0" y="1552247"/>
+                      <a:pt x="0" y="1537728"/>
+                    </a:cubicBezTo>
+                    <a:lnTo>
+                      <a:pt x="0" y="26289"/>
+                    </a:lnTo>
+                    <a:cubicBezTo>
+                      <a:pt x="0" y="11770"/>
+                      <a:pt x="11770" y="0"/>
+                      <a:pt x="26289" y="0"/>
+                    </a:cubicBezTo>
+                    <a:close/>
+                  </a:path>
+                </a:pathLst>
+              </a:custGeom>
+              <a:solidFill>
+                <a:srgbClr val="DB4A2B"/>
+              </a:solidFill>
+              <a:ln>
+                <a:noFill/>
+              </a:ln>
+            </p:spPr>
+            <p:txBody>
+              <a:bodyPr anchorCtr="0" anchor="t" bIns="45700" lIns="91425" spcFirstLastPara="1" rIns="91425" wrap="square" tIns="45700">
+                <a:noAutofit/>
+              </a:bodyPr>
+              <a:lstStyle/>
+              <a:p>
+                <a:pPr indent="0" lvl="0" marL="0" marR="0" rtl="0" algn="l">
+                  <a:spcBef>
+                    <a:spcPts val="0"/>
+                  </a:spcBef>
+                  <a:spcAft>
+                    <a:spcPts val="0"/>
+                  </a:spcAft>
+                  <a:buNone/>
+                </a:pPr>
+                <a:r>
+                  <a:t/>
+                </a:r>
+                <a:endParaRPr sz="1800">
+                  <a:solidFill>
+                    <a:schemeClr val="dk1"/>
+                  </a:solidFill>
+                  <a:latin typeface="Calibri"/>
+                  <a:ea typeface="Calibri"/>
+                  <a:cs typeface="Calibri"/>
+                  <a:sym typeface="Calibri"/>
+                </a:endParaRPr>
+              </a:p>
+            </p:txBody>
+          </p:sp>
+          <p:sp>
+            <p:nvSpPr>
+              <p:cNvPr id="443" name="Google Shape;443;p33"/>
+              <p:cNvSpPr txBox="1"/>
+              <p:nvPr/>
+            </p:nvSpPr>
+            <p:spPr>
+              <a:xfrm>
+                <a:off x="0" y="-47625"/>
+                <a:ext cx="3955800" cy="1611600"/>
+              </a:xfrm>
+              <a:prstGeom prst="rect">
+                <a:avLst/>
+              </a:prstGeom>
+              <a:noFill/>
+              <a:ln>
+                <a:noFill/>
+              </a:ln>
+            </p:spPr>
+            <p:txBody>
+              <a:bodyPr anchorCtr="0" anchor="ctr" bIns="50800" lIns="50800" spcFirstLastPara="1" rIns="50800" wrap="square" tIns="50800">
+                <a:noAutofit/>
+              </a:bodyPr>
+              <a:lstStyle/>
+              <a:p>
+                <a:pPr indent="0" lvl="0" marL="0" marR="0" rtl="0" algn="ctr">
+                  <a:lnSpc>
+                    <a:spcPct val="147722"/>
+                  </a:lnSpc>
+                  <a:spcBef>
+                    <a:spcPts val="0"/>
+                  </a:spcBef>
+                  <a:spcAft>
+                    <a:spcPts val="0"/>
+                  </a:spcAft>
+                  <a:buNone/>
+                </a:pPr>
+                <a:r>
+                  <a:t/>
+                </a:r>
+                <a:endParaRPr sz="1800">
+                  <a:solidFill>
+                    <a:schemeClr val="dk1"/>
+                  </a:solidFill>
+                  <a:latin typeface="Calibri"/>
+                  <a:ea typeface="Calibri"/>
+                  <a:cs typeface="Calibri"/>
+                  <a:sym typeface="Calibri"/>
+                </a:endParaRPr>
+              </a:p>
+            </p:txBody>
+          </p:sp>
+        </p:grpSp>
+      </p:grpSp>
+      <p:grpSp>
+        <p:nvGrpSpPr>
+          <p:cNvPr id="444" name="Google Shape;444;p33"/>
+          <p:cNvGrpSpPr/>
+          <p:nvPr/>
+        </p:nvGrpSpPr>
+        <p:grpSpPr>
+          <a:xfrm>
+            <a:off x="4042366" y="757298"/>
+            <a:ext cx="10203337" cy="1746354"/>
+            <a:chOff x="0" y="-47625"/>
+            <a:chExt cx="2687281" cy="459942"/>
+          </a:xfrm>
+        </p:grpSpPr>
+        <p:sp>
+          <p:nvSpPr>
+            <p:cNvPr id="445" name="Google Shape;445;p33"/>
+            <p:cNvSpPr/>
+            <p:nvPr/>
+          </p:nvSpPr>
+          <p:spPr>
+            <a:xfrm>
+              <a:off x="0" y="0"/>
+              <a:ext cx="2687281" cy="412317"/>
+            </a:xfrm>
+            <a:custGeom>
+              <a:rect b="b" l="l" r="r" t="t"/>
+              <a:pathLst>
+                <a:path extrusionOk="0" h="412317" w="2687281">
+                  <a:moveTo>
+                    <a:pt x="203200" y="0"/>
+                  </a:moveTo>
+                  <a:lnTo>
+                    <a:pt x="2687281" y="0"/>
+                  </a:lnTo>
+                  <a:lnTo>
+                    <a:pt x="2484081" y="412317"/>
+                  </a:lnTo>
+                  <a:lnTo>
+                    <a:pt x="0" y="412317"/>
+                  </a:lnTo>
+                  <a:lnTo>
+                    <a:pt x="203200" y="0"/>
+                  </a:lnTo>
+                  <a:close/>
+                </a:path>
+              </a:pathLst>
+            </a:custGeom>
+            <a:solidFill>
+              <a:srgbClr val="DB4A2B"/>
+            </a:solidFill>
+            <a:ln>
+              <a:noFill/>
+            </a:ln>
+          </p:spPr>
+          <p:txBody>
+            <a:bodyPr anchorCtr="0" anchor="t" bIns="45700" lIns="91425" spcFirstLastPara="1" rIns="91425" wrap="square" tIns="45700">
+              <a:noAutofit/>
+            </a:bodyPr>
+            <a:lstStyle/>
+            <a:p>
+              <a:pPr indent="0" lvl="0" marL="0" marR="0" rtl="0" algn="l">
+                <a:spcBef>
+                  <a:spcPts val="0"/>
+                </a:spcBef>
+                <a:spcAft>
+                  <a:spcPts val="0"/>
+                </a:spcAft>
+                <a:buNone/>
+              </a:pPr>
+              <a:r>
+                <a:t/>
+              </a:r>
+              <a:endParaRPr sz="1800">
+                <a:solidFill>
+                  <a:schemeClr val="dk1"/>
+                </a:solidFill>
+                <a:latin typeface="Calibri"/>
+                <a:ea typeface="Calibri"/>
+                <a:cs typeface="Calibri"/>
+                <a:sym typeface="Calibri"/>
+              </a:endParaRPr>
+            </a:p>
+          </p:txBody>
+        </p:sp>
+        <p:sp>
+          <p:nvSpPr>
+            <p:cNvPr id="446" name="Google Shape;446;p33"/>
+            <p:cNvSpPr txBox="1"/>
+            <p:nvPr/>
+          </p:nvSpPr>
+          <p:spPr>
+            <a:xfrm>
+              <a:off x="101600" y="-47625"/>
+              <a:ext cx="2484000" cy="459900"/>
+            </a:xfrm>
+            <a:prstGeom prst="rect">
+              <a:avLst/>
+            </a:prstGeom>
+            <a:noFill/>
+            <a:ln>
+              <a:noFill/>
+            </a:ln>
+          </p:spPr>
+          <p:txBody>
+            <a:bodyPr anchorCtr="0" anchor="ctr" bIns="50800" lIns="50800" spcFirstLastPara="1" rIns="50800" wrap="square" tIns="50800">
+              <a:noAutofit/>
+            </a:bodyPr>
+            <a:lstStyle/>
+            <a:p>
+              <a:pPr indent="0" lvl="0" marL="0" marR="0" rtl="0" algn="ctr">
+                <a:lnSpc>
+                  <a:spcPct val="147722"/>
+                </a:lnSpc>
+                <a:spcBef>
+                  <a:spcPts val="0"/>
+                </a:spcBef>
+                <a:spcAft>
+                  <a:spcPts val="0"/>
+                </a:spcAft>
+                <a:buNone/>
+              </a:pPr>
+              <a:r>
+                <a:t/>
+              </a:r>
+              <a:endParaRPr sz="1800">
+                <a:solidFill>
+                  <a:schemeClr val="dk1"/>
+                </a:solidFill>
+                <a:latin typeface="Calibri"/>
+                <a:ea typeface="Calibri"/>
+                <a:cs typeface="Calibri"/>
+                <a:sym typeface="Calibri"/>
+              </a:endParaRPr>
+            </a:p>
+          </p:txBody>
+        </p:sp>
+      </p:grpSp>
       <p:sp>
         <p:nvSpPr>
-          <p:cNvPr id="437" name="Google Shape;437;p33"/>
+          <p:cNvPr id="447" name="Google Shape;447;p33"/>
+          <p:cNvSpPr/>
+          <p:nvPr/>
+        </p:nvSpPr>
+        <p:spPr>
+          <a:xfrm>
+            <a:off x="14057602" y="1215802"/>
+            <a:ext cx="2881094" cy="1990574"/>
+          </a:xfrm>
+          <a:custGeom>
+            <a:rect b="b" l="l" r="r" t="t"/>
+            <a:pathLst>
+              <a:path extrusionOk="0" h="1990574" w="2881094">
+                <a:moveTo>
+                  <a:pt x="0" y="0"/>
+                </a:moveTo>
+                <a:lnTo>
+                  <a:pt x="2881094" y="0"/>
+                </a:lnTo>
+                <a:lnTo>
+                  <a:pt x="2881094" y="1990574"/>
+                </a:lnTo>
+                <a:lnTo>
+                  <a:pt x="0" y="1990574"/>
+                </a:lnTo>
+                <a:lnTo>
+                  <a:pt x="0" y="0"/>
+                </a:lnTo>
+                <a:close/>
+              </a:path>
+            </a:pathLst>
+          </a:custGeom>
+          <a:blipFill rotWithShape="1">
+            <a:blip r:embed="rId3">
+              <a:alphaModFix/>
+            </a:blip>
+            <a:stretch>
+              <a:fillRect b="0" l="0" r="0" t="0"/>
+            </a:stretch>
+          </a:blipFill>
+          <a:ln>
+            <a:noFill/>
+          </a:ln>
+        </p:spPr>
+        <p:txBody>
+          <a:bodyPr anchorCtr="0" anchor="t" bIns="45700" lIns="91425" spcFirstLastPara="1" rIns="91425" wrap="square" tIns="45700">
+            <a:noAutofit/>
+          </a:bodyPr>
+          <a:lstStyle/>
+          <a:p>
+            <a:pPr indent="0" lvl="0" marL="0" marR="0" rtl="0" algn="l">
+              <a:spcBef>
+                <a:spcPts val="0"/>
+              </a:spcBef>
+              <a:spcAft>
+                <a:spcPts val="0"/>
+              </a:spcAft>
+              <a:buNone/>
+            </a:pPr>
+            <a:r>
+              <a:t/>
+            </a:r>
+            <a:endParaRPr sz="1800">
+              <a:solidFill>
+                <a:schemeClr val="dk1"/>
+              </a:solidFill>
+              <a:latin typeface="Calibri"/>
+              <a:ea typeface="Calibri"/>
+              <a:cs typeface="Calibri"/>
+              <a:sym typeface="Calibri"/>
+            </a:endParaRPr>
+          </a:p>
+        </p:txBody>
+      </p:sp>
+      <p:sp>
+        <p:nvSpPr>
+          <p:cNvPr id="448" name="Google Shape;448;p33"/>
+          <p:cNvSpPr/>
+          <p:nvPr/>
+        </p:nvSpPr>
+        <p:spPr>
+          <a:xfrm>
+            <a:off x="15021104" y="8305483"/>
+            <a:ext cx="7315200" cy="1556143"/>
+          </a:xfrm>
+          <a:custGeom>
+            <a:rect b="b" l="l" r="r" t="t"/>
+            <a:pathLst>
+              <a:path extrusionOk="0" h="1556143" w="7315200">
+                <a:moveTo>
+                  <a:pt x="0" y="0"/>
+                </a:moveTo>
+                <a:lnTo>
+                  <a:pt x="7315200" y="0"/>
+                </a:lnTo>
+                <a:lnTo>
+                  <a:pt x="7315200" y="1556143"/>
+                </a:lnTo>
+                <a:lnTo>
+                  <a:pt x="0" y="1556143"/>
+                </a:lnTo>
+                <a:lnTo>
+                  <a:pt x="0" y="0"/>
+                </a:lnTo>
+                <a:close/>
+              </a:path>
+            </a:pathLst>
+          </a:custGeom>
+          <a:blipFill rotWithShape="1">
+            <a:blip r:embed="rId4">
+              <a:alphaModFix/>
+            </a:blip>
+            <a:stretch>
+              <a:fillRect b="0" l="0" r="0" t="0"/>
+            </a:stretch>
+          </a:blipFill>
+          <a:ln>
+            <a:noFill/>
+          </a:ln>
+        </p:spPr>
+        <p:txBody>
+          <a:bodyPr anchorCtr="0" anchor="t" bIns="45700" lIns="91425" spcFirstLastPara="1" rIns="91425" wrap="square" tIns="45700">
+            <a:noAutofit/>
+          </a:bodyPr>
+          <a:lstStyle/>
+          <a:p>
+            <a:pPr indent="0" lvl="0" marL="0" marR="0" rtl="0" algn="l">
+              <a:spcBef>
+                <a:spcPts val="0"/>
+              </a:spcBef>
+              <a:spcAft>
+                <a:spcPts val="0"/>
+              </a:spcAft>
+              <a:buNone/>
+            </a:pPr>
+            <a:r>
+              <a:t/>
+            </a:r>
+            <a:endParaRPr sz="1800">
+              <a:solidFill>
+                <a:schemeClr val="dk1"/>
+              </a:solidFill>
+              <a:latin typeface="Calibri"/>
+              <a:ea typeface="Calibri"/>
+              <a:cs typeface="Calibri"/>
+              <a:sym typeface="Calibri"/>
+            </a:endParaRPr>
+          </a:p>
+        </p:txBody>
+      </p:sp>
+      <p:sp>
+        <p:nvSpPr>
+          <p:cNvPr id="449" name="Google Shape;449;p33"/>
+          <p:cNvSpPr/>
+          <p:nvPr/>
+        </p:nvSpPr>
+        <p:spPr>
+          <a:xfrm flipH="1">
+            <a:off x="-4711854" y="414784"/>
+            <a:ext cx="7315200" cy="1556143"/>
+          </a:xfrm>
+          <a:custGeom>
+            <a:rect b="b" l="l" r="r" t="t"/>
+            <a:pathLst>
+              <a:path extrusionOk="0" h="1556143" w="7315200">
+                <a:moveTo>
+                  <a:pt x="7315200" y="0"/>
+                </a:moveTo>
+                <a:lnTo>
+                  <a:pt x="0" y="0"/>
+                </a:lnTo>
+                <a:lnTo>
+                  <a:pt x="0" y="1556143"/>
+                </a:lnTo>
+                <a:lnTo>
+                  <a:pt x="7315200" y="1556143"/>
+                </a:lnTo>
+                <a:lnTo>
+                  <a:pt x="7315200" y="0"/>
+                </a:lnTo>
+                <a:close/>
+              </a:path>
+            </a:pathLst>
+          </a:custGeom>
+          <a:blipFill rotWithShape="1">
+            <a:blip r:embed="rId4">
+              <a:alphaModFix/>
+            </a:blip>
+            <a:stretch>
+              <a:fillRect b="0" l="0" r="0" t="0"/>
+            </a:stretch>
+          </a:blipFill>
+          <a:ln>
+            <a:noFill/>
+          </a:ln>
+        </p:spPr>
+        <p:txBody>
+          <a:bodyPr anchorCtr="0" anchor="t" bIns="45700" lIns="91425" spcFirstLastPara="1" rIns="91425" wrap="square" tIns="45700">
+            <a:noAutofit/>
+          </a:bodyPr>
+          <a:lstStyle/>
+          <a:p>
+            <a:pPr indent="0" lvl="0" marL="0" marR="0" rtl="0" algn="l">
+              <a:spcBef>
+                <a:spcPts val="0"/>
+              </a:spcBef>
+              <a:spcAft>
+                <a:spcPts val="0"/>
+              </a:spcAft>
+              <a:buNone/>
+            </a:pPr>
+            <a:r>
+              <a:t/>
+            </a:r>
+            <a:endParaRPr sz="1800">
+              <a:solidFill>
+                <a:schemeClr val="dk1"/>
+              </a:solidFill>
+              <a:latin typeface="Calibri"/>
+              <a:ea typeface="Calibri"/>
+              <a:cs typeface="Calibri"/>
+              <a:sym typeface="Calibri"/>
+            </a:endParaRPr>
+          </a:p>
+        </p:txBody>
+      </p:sp>
+      <p:sp>
+        <p:nvSpPr>
+          <p:cNvPr id="450" name="Google Shape;450;p33"/>
+          <p:cNvSpPr txBox="1"/>
+          <p:nvPr/>
+        </p:nvSpPr>
+        <p:spPr>
+          <a:xfrm>
+            <a:off x="6008325" y="1198775"/>
+            <a:ext cx="6972000" cy="1015800"/>
+          </a:xfrm>
+          <a:prstGeom prst="rect">
+            <a:avLst/>
+          </a:prstGeom>
+          <a:noFill/>
+          <a:ln>
+            <a:noFill/>
+          </a:ln>
+        </p:spPr>
+        <p:txBody>
+          <a:bodyPr anchorCtr="0" anchor="t" bIns="0" lIns="0" spcFirstLastPara="1" rIns="0" wrap="square" tIns="0">
+            <a:spAutoFit/>
+          </a:bodyPr>
+          <a:lstStyle/>
+          <a:p>
+            <a:pPr indent="0" lvl="0" marL="0" rtl="0" algn="l">
+              <a:lnSpc>
+                <a:spcPct val="107916"/>
+              </a:lnSpc>
+              <a:spcBef>
+                <a:spcPts val="0"/>
+              </a:spcBef>
+              <a:spcAft>
+                <a:spcPts val="800"/>
+              </a:spcAft>
+              <a:buSzPts val="1100"/>
+              <a:buNone/>
+            </a:pPr>
+            <a:r>
+              <a:rPr b="1" lang="en-US" sz="6600">
+                <a:solidFill>
+                  <a:schemeClr val="dk1"/>
+                </a:solidFill>
+                <a:latin typeface="Times New Roman"/>
+                <a:ea typeface="Times New Roman"/>
+                <a:cs typeface="Times New Roman"/>
+                <a:sym typeface="Times New Roman"/>
+              </a:rPr>
+              <a:t>  REFERENCES:</a:t>
+            </a:r>
+            <a:endParaRPr b="1" sz="6600">
+              <a:solidFill>
+                <a:srgbClr val="E4E2DD"/>
+              </a:solidFill>
+              <a:latin typeface="Arial"/>
+              <a:ea typeface="Arial"/>
+              <a:cs typeface="Arial"/>
+              <a:sym typeface="Arial"/>
+            </a:endParaRPr>
+          </a:p>
+        </p:txBody>
+      </p:sp>
+      <p:sp>
+        <p:nvSpPr>
+          <p:cNvPr id="451" name="Google Shape;451;p33"/>
+          <p:cNvSpPr txBox="1"/>
+          <p:nvPr/>
+        </p:nvSpPr>
+        <p:spPr>
+          <a:xfrm>
+            <a:off x="2300325" y="3081775"/>
+            <a:ext cx="8764500" cy="4543200"/>
+          </a:xfrm>
+          <a:prstGeom prst="rect">
+            <a:avLst/>
+          </a:prstGeom>
+          <a:noFill/>
+          <a:ln>
+            <a:noFill/>
+          </a:ln>
+        </p:spPr>
+        <p:txBody>
+          <a:bodyPr anchorCtr="0" anchor="t" bIns="91425" lIns="91425" spcFirstLastPara="1" rIns="91425" wrap="square" tIns="91425">
+            <a:spAutoFit/>
+          </a:bodyPr>
+          <a:lstStyle/>
+          <a:p>
+            <a:pPr indent="0" lvl="0" marL="0" rtl="0" algn="l">
+              <a:lnSpc>
+                <a:spcPct val="107916"/>
+              </a:lnSpc>
+              <a:spcBef>
+                <a:spcPts val="0"/>
+              </a:spcBef>
+              <a:spcAft>
+                <a:spcPts val="0"/>
+              </a:spcAft>
+              <a:buNone/>
+            </a:pPr>
+            <a:r>
+              <a:t/>
+            </a:r>
+            <a:endParaRPr sz="2200">
+              <a:solidFill>
+                <a:schemeClr val="dk1"/>
+              </a:solidFill>
+              <a:latin typeface="Times New Roman"/>
+              <a:ea typeface="Times New Roman"/>
+              <a:cs typeface="Times New Roman"/>
+              <a:sym typeface="Times New Roman"/>
+            </a:endParaRPr>
+          </a:p>
+          <a:p>
+            <a:pPr indent="-368300" lvl="0" marL="457200" rtl="0" algn="l">
+              <a:lnSpc>
+                <a:spcPct val="107916"/>
+              </a:lnSpc>
+              <a:spcBef>
+                <a:spcPts val="0"/>
+              </a:spcBef>
+              <a:spcAft>
+                <a:spcPts val="0"/>
+              </a:spcAft>
+              <a:buClr>
+                <a:schemeClr val="dk1"/>
+              </a:buClr>
+              <a:buSzPts val="2200"/>
+              <a:buFont typeface="Times New Roman"/>
+              <a:buChar char="●"/>
+            </a:pPr>
+            <a:r>
+              <a:rPr lang="en-US" sz="2200">
+                <a:solidFill>
+                  <a:schemeClr val="dk1"/>
+                </a:solidFill>
+                <a:latin typeface="Times New Roman"/>
+                <a:ea typeface="Times New Roman"/>
+                <a:cs typeface="Times New Roman"/>
+                <a:sym typeface="Times New Roman"/>
+              </a:rPr>
+              <a:t>Traffic Accident Dataset Source (if from Kaggle or any public dataset)</a:t>
+            </a:r>
+            <a:endParaRPr sz="2200">
+              <a:solidFill>
+                <a:schemeClr val="dk1"/>
+              </a:solidFill>
+              <a:latin typeface="Times New Roman"/>
+              <a:ea typeface="Times New Roman"/>
+              <a:cs typeface="Times New Roman"/>
+              <a:sym typeface="Times New Roman"/>
+            </a:endParaRPr>
+          </a:p>
+          <a:p>
+            <a:pPr indent="0" lvl="0" marL="0" rtl="0" algn="l">
+              <a:lnSpc>
+                <a:spcPct val="107916"/>
+              </a:lnSpc>
+              <a:spcBef>
+                <a:spcPts val="0"/>
+              </a:spcBef>
+              <a:spcAft>
+                <a:spcPts val="0"/>
+              </a:spcAft>
+              <a:buNone/>
+            </a:pPr>
+            <a:r>
+              <a:rPr lang="en-US" sz="2200">
+                <a:solidFill>
+                  <a:schemeClr val="dk1"/>
+                </a:solidFill>
+                <a:latin typeface="Times New Roman"/>
+                <a:ea typeface="Times New Roman"/>
+                <a:cs typeface="Times New Roman"/>
+                <a:sym typeface="Times New Roman"/>
+              </a:rPr>
+              <a:t>           </a:t>
+            </a:r>
+            <a:r>
+              <a:rPr lang="en-US" sz="2200" u="sng">
+                <a:solidFill>
+                  <a:srgbClr val="1155CC"/>
+                </a:solidFill>
+                <a:latin typeface="Times New Roman"/>
+                <a:ea typeface="Times New Roman"/>
+                <a:cs typeface="Times New Roman"/>
+                <a:sym typeface="Times New Roman"/>
+                <a:hlinkClick r:id="rId5">
+                  <a:extLst>
+                    <a:ext uri="{A12FA001-AC4F-418D-AE19-62706E023703}">
+                      <ahyp:hlinkClr val="tx"/>
+                    </a:ext>
+                  </a:extLst>
+                </a:hlinkClick>
+              </a:rPr>
+              <a:t>https://www.kaggle.com/datasets/adilshamim8/globa</a:t>
+            </a:r>
+            <a:r>
+              <a:rPr lang="en-US" sz="2200" u="sng">
+                <a:solidFill>
+                  <a:srgbClr val="1155CC"/>
+                </a:solidFill>
+                <a:latin typeface="Times New Roman"/>
+                <a:ea typeface="Times New Roman"/>
+                <a:cs typeface="Times New Roman"/>
+                <a:sym typeface="Times New Roman"/>
+                <a:hlinkClick r:id="rId6">
+                  <a:extLst>
+                    <a:ext uri="{A12FA001-AC4F-418D-AE19-62706E023703}">
+                      <ahyp:hlinkClr val="tx"/>
+                    </a:ext>
+                  </a:extLst>
+                </a:hlinkClick>
+              </a:rPr>
+              <a:t>l-traffic-accidents-dataset</a:t>
+            </a:r>
+            <a:endParaRPr sz="2200"/>
+          </a:p>
+          <a:p>
+            <a:pPr indent="0" lvl="0" marL="0" rtl="0" algn="l">
+              <a:lnSpc>
+                <a:spcPct val="107916"/>
+              </a:lnSpc>
+              <a:spcBef>
+                <a:spcPts val="0"/>
+              </a:spcBef>
+              <a:spcAft>
+                <a:spcPts val="0"/>
+              </a:spcAft>
+              <a:buNone/>
+            </a:pPr>
+            <a:r>
+              <a:t/>
+            </a:r>
+            <a:endParaRPr sz="2200">
+              <a:solidFill>
+                <a:schemeClr val="dk1"/>
+              </a:solidFill>
+              <a:latin typeface="Calibri"/>
+              <a:ea typeface="Calibri"/>
+              <a:cs typeface="Calibri"/>
+              <a:sym typeface="Calibri"/>
+            </a:endParaRPr>
+          </a:p>
+          <a:p>
+            <a:pPr indent="-368300" lvl="0" marL="457200" rtl="0" algn="l">
+              <a:lnSpc>
+                <a:spcPct val="107916"/>
+              </a:lnSpc>
+              <a:spcBef>
+                <a:spcPts val="0"/>
+              </a:spcBef>
+              <a:spcAft>
+                <a:spcPts val="0"/>
+              </a:spcAft>
+              <a:buClr>
+                <a:schemeClr val="dk1"/>
+              </a:buClr>
+              <a:buSzPts val="2200"/>
+              <a:buFont typeface="Calibri"/>
+              <a:buChar char="●"/>
+            </a:pPr>
+            <a:r>
+              <a:rPr lang="en-US" sz="2200">
+                <a:solidFill>
+                  <a:schemeClr val="dk1"/>
+                </a:solidFill>
+                <a:latin typeface="Calibri"/>
+                <a:ea typeface="Calibri"/>
+                <a:cs typeface="Calibri"/>
+                <a:sym typeface="Calibri"/>
+              </a:rPr>
+              <a:t>Jupyter Notebook Documentation</a:t>
+            </a:r>
+            <a:endParaRPr sz="2200">
+              <a:solidFill>
+                <a:schemeClr val="dk1"/>
+              </a:solidFill>
+              <a:latin typeface="Calibri"/>
+              <a:ea typeface="Calibri"/>
+              <a:cs typeface="Calibri"/>
+              <a:sym typeface="Calibri"/>
+            </a:endParaRPr>
+          </a:p>
+          <a:p>
+            <a:pPr indent="0" lvl="0" marL="0" rtl="0" algn="l">
+              <a:lnSpc>
+                <a:spcPct val="107916"/>
+              </a:lnSpc>
+              <a:spcBef>
+                <a:spcPts val="0"/>
+              </a:spcBef>
+              <a:spcAft>
+                <a:spcPts val="0"/>
+              </a:spcAft>
+              <a:buNone/>
+            </a:pPr>
+            <a:r>
+              <a:rPr lang="en-US" sz="2200">
+                <a:solidFill>
+                  <a:schemeClr val="dk1"/>
+                </a:solidFill>
+                <a:latin typeface="Calibri"/>
+                <a:ea typeface="Calibri"/>
+                <a:cs typeface="Calibri"/>
+                <a:sym typeface="Calibri"/>
+              </a:rPr>
+              <a:t>           </a:t>
+            </a:r>
+            <a:r>
+              <a:rPr lang="en-US" sz="2200" u="sng">
+                <a:solidFill>
+                  <a:srgbClr val="1155CC"/>
+                </a:solidFill>
+                <a:latin typeface="Calibri"/>
+                <a:ea typeface="Calibri"/>
+                <a:cs typeface="Calibri"/>
+                <a:sym typeface="Calibri"/>
+                <a:hlinkClick r:id="rId7">
+                  <a:extLst>
+                    <a:ext uri="{A12FA001-AC4F-418D-AE19-62706E023703}">
+                      <ahyp:hlinkClr val="tx"/>
+                    </a:ext>
+                  </a:extLst>
+                </a:hlinkClick>
+              </a:rPr>
+              <a:t>https://jupyter-notebook.readthedocs.io/en/stable/</a:t>
+            </a:r>
+            <a:endParaRPr sz="2200">
+              <a:solidFill>
+                <a:schemeClr val="dk1"/>
+              </a:solidFill>
+              <a:latin typeface="Calibri"/>
+              <a:ea typeface="Calibri"/>
+              <a:cs typeface="Calibri"/>
+              <a:sym typeface="Calibri"/>
+            </a:endParaRPr>
+          </a:p>
+          <a:p>
+            <a:pPr indent="0" lvl="0" marL="0" rtl="0" algn="l">
+              <a:lnSpc>
+                <a:spcPct val="107916"/>
+              </a:lnSpc>
+              <a:spcBef>
+                <a:spcPts val="0"/>
+              </a:spcBef>
+              <a:spcAft>
+                <a:spcPts val="0"/>
+              </a:spcAft>
+              <a:buNone/>
+            </a:pPr>
+            <a:r>
+              <a:t/>
+            </a:r>
+            <a:endParaRPr sz="2200">
+              <a:solidFill>
+                <a:schemeClr val="dk1"/>
+              </a:solidFill>
+              <a:latin typeface="Calibri"/>
+              <a:ea typeface="Calibri"/>
+              <a:cs typeface="Calibri"/>
+              <a:sym typeface="Calibri"/>
+            </a:endParaRPr>
+          </a:p>
+          <a:p>
+            <a:pPr indent="-368300" lvl="0" marL="457200" rtl="0" algn="l">
+              <a:lnSpc>
+                <a:spcPct val="107916"/>
+              </a:lnSpc>
+              <a:spcBef>
+                <a:spcPts val="0"/>
+              </a:spcBef>
+              <a:spcAft>
+                <a:spcPts val="0"/>
+              </a:spcAft>
+              <a:buClr>
+                <a:schemeClr val="dk1"/>
+              </a:buClr>
+              <a:buSzPts val="2200"/>
+              <a:buFont typeface="Calibri"/>
+              <a:buChar char="●"/>
+            </a:pPr>
+            <a:r>
+              <a:rPr lang="en-US" sz="2200">
+                <a:solidFill>
+                  <a:schemeClr val="dk1"/>
+                </a:solidFill>
+                <a:latin typeface="Calibri"/>
+                <a:ea typeface="Calibri"/>
+                <a:cs typeface="Calibri"/>
+                <a:sym typeface="Calibri"/>
+              </a:rPr>
+              <a:t>Github Repository Link</a:t>
+            </a:r>
+            <a:endParaRPr sz="2200">
+              <a:solidFill>
+                <a:schemeClr val="dk1"/>
+              </a:solidFill>
+              <a:latin typeface="Calibri"/>
+              <a:ea typeface="Calibri"/>
+              <a:cs typeface="Calibri"/>
+              <a:sym typeface="Calibri"/>
+            </a:endParaRPr>
+          </a:p>
+          <a:p>
+            <a:pPr indent="0" lvl="0" marL="0" rtl="0" algn="l">
+              <a:lnSpc>
+                <a:spcPct val="107916"/>
+              </a:lnSpc>
+              <a:spcBef>
+                <a:spcPts val="0"/>
+              </a:spcBef>
+              <a:spcAft>
+                <a:spcPts val="0"/>
+              </a:spcAft>
+              <a:buNone/>
+            </a:pPr>
+            <a:r>
+              <a:rPr lang="en-US" sz="2200">
+                <a:solidFill>
+                  <a:schemeClr val="dk1"/>
+                </a:solidFill>
+                <a:latin typeface="Calibri"/>
+                <a:ea typeface="Calibri"/>
+                <a:cs typeface="Calibri"/>
+                <a:sym typeface="Calibri"/>
+              </a:rPr>
+              <a:t>           </a:t>
+            </a:r>
+            <a:r>
+              <a:rPr lang="en-US" sz="2200" u="sng">
+                <a:solidFill>
+                  <a:schemeClr val="hlink"/>
+                </a:solidFill>
+                <a:latin typeface="Calibri"/>
+                <a:ea typeface="Calibri"/>
+                <a:cs typeface="Calibri"/>
+                <a:sym typeface="Calibri"/>
+                <a:hlinkClick r:id="rId8"/>
+              </a:rPr>
+              <a:t>https://github.com/VISWANADHVEERA/traffic-accident-patterns</a:t>
+            </a:r>
+            <a:endParaRPr sz="2200">
+              <a:solidFill>
+                <a:schemeClr val="dk1"/>
+              </a:solidFill>
+              <a:latin typeface="Calibri"/>
+              <a:ea typeface="Calibri"/>
+              <a:cs typeface="Calibri"/>
+              <a:sym typeface="Calibri"/>
+            </a:endParaRPr>
+          </a:p>
+          <a:p>
+            <a:pPr indent="0" lvl="0" marL="0" rtl="0" algn="l">
+              <a:lnSpc>
+                <a:spcPct val="107916"/>
+              </a:lnSpc>
+              <a:spcBef>
+                <a:spcPts val="0"/>
+              </a:spcBef>
+              <a:spcAft>
+                <a:spcPts val="0"/>
+              </a:spcAft>
+              <a:buNone/>
+            </a:pPr>
+            <a:r>
+              <a:t/>
+            </a:r>
+            <a:endParaRPr sz="2200"/>
+          </a:p>
+        </p:txBody>
+      </p:sp>
+    </p:spTree>
+  </p:cSld>
+  <p:clrMapOvr>
+    <a:masterClrMapping/>
+  </p:clrMapOvr>
+</p:sld>
+</file>
+
+<file path=ppt/slides/slide22.xml><?xml version="1.0" encoding="utf-8"?>
+<p:sld xmlns:a="http://schemas.openxmlformats.org/drawingml/2006/main" xmlns:r="http://schemas.openxmlformats.org/officeDocument/2006/relationships" xmlns:mc="http://schemas.openxmlformats.org/markup-compatibility/2006" xmlns:mv="urn:schemas-microsoft-com:mac:vml" xmlns:p="http://schemas.openxmlformats.org/presentationml/2006/main" xmlns:c="http://schemas.openxmlformats.org/drawingml/2006/chart" xmlns:dgm="http://schemas.openxmlformats.org/drawingml/2006/diagram" xmlns:o="urn:schemas-microsoft-com:office:office" xmlns:v="urn:schemas-microsoft-com:vml" xmlns:pvml="urn:schemas-microsoft-com:office:powerpoint" xmlns:com="http://schemas.openxmlformats.org/drawingml/2006/compatibility" xmlns:p14="http://schemas.microsoft.com/office/powerpoint/2010/main" xmlns:p15="http://schemas.microsoft.com/office/powerpoint/2012/main" xmlns:ahyp="http://schemas.microsoft.com/office/drawing/2018/hyperlinkcolor">
+  <p:cSld>
+    <p:bg>
+      <p:bgPr>
+        <a:solidFill>
+          <a:srgbClr val="2B2B2B"/>
+        </a:solidFill>
+      </p:bgPr>
+    </p:bg>
+    <p:spTree>
+      <p:nvGrpSpPr>
+        <p:cNvPr id="455" name="Shape 455"/>
+        <p:cNvGrpSpPr/>
+        <p:nvPr/>
+      </p:nvGrpSpPr>
+      <p:grpSpPr>
+        <a:xfrm>
+          <a:off x="0" y="0"/>
+          <a:ext cx="0" cy="0"/>
+          <a:chOff x="0" y="0"/>
+          <a:chExt cx="0" cy="0"/>
+        </a:xfrm>
+      </p:grpSpPr>
+      <p:sp>
+        <p:nvSpPr>
+          <p:cNvPr id="456" name="Google Shape;456;p34"/>
           <p:cNvSpPr/>
           <p:nvPr/>
         </p:nvSpPr>
@@ -25042,7 +26203,7 @@
       </p:sp>
       <p:grpSp>
         <p:nvGrpSpPr>
-          <p:cNvPr id="438" name="Google Shape;438;p33"/>
+          <p:cNvPr id="457" name="Google Shape;457;p34"/>
           <p:cNvGrpSpPr/>
           <p:nvPr/>
         </p:nvGrpSpPr>
@@ -25056,7 +26217,7 @@
         </p:grpSpPr>
         <p:sp>
           <p:nvSpPr>
-            <p:cNvPr id="439" name="Google Shape;439;p33"/>
+            <p:cNvPr id="458" name="Google Shape;458;p34"/>
             <p:cNvSpPr/>
             <p:nvPr/>
           </p:nvSpPr>
@@ -25127,7 +26288,7 @@
         </p:sp>
         <p:sp>
           <p:nvSpPr>
-            <p:cNvPr id="440" name="Google Shape;440;p33"/>
+            <p:cNvPr id="459" name="Google Shape;459;p34"/>
             <p:cNvSpPr txBox="1"/>
             <p:nvPr/>
           </p:nvSpPr>
@@ -25180,7 +26341,7 @@
       </p:grpSp>
       <p:sp>
         <p:nvSpPr>
-          <p:cNvPr id="441" name="Google Shape;441;p33"/>
+          <p:cNvPr id="460" name="Google Shape;460;p34"/>
           <p:cNvSpPr/>
           <p:nvPr/>
         </p:nvSpPr>
@@ -25256,7 +26417,7 @@
       </p:sp>
       <p:sp>
         <p:nvSpPr>
-          <p:cNvPr id="442" name="Google Shape;442;p33"/>
+          <p:cNvPr id="461" name="Google Shape;461;p34"/>
           <p:cNvSpPr/>
           <p:nvPr/>
         </p:nvSpPr>
@@ -25332,7 +26493,7 @@
       </p:sp>
       <p:sp>
         <p:nvSpPr>
-          <p:cNvPr id="443" name="Google Shape;443;p33"/>
+          <p:cNvPr id="462" name="Google Shape;462;p34"/>
           <p:cNvSpPr txBox="1"/>
           <p:nvPr/>
         </p:nvSpPr>
@@ -25385,7 +26546,7 @@
       </p:sp>
       <p:sp>
         <p:nvSpPr>
-          <p:cNvPr id="444" name="Google Shape;444;p33"/>
+          <p:cNvPr id="463" name="Google Shape;463;p34"/>
           <p:cNvSpPr/>
           <p:nvPr/>
         </p:nvSpPr>
@@ -25693,7 +26854,7 @@
 </p:sld>
 </file>
 
-<file path=ppt/slides/slide22.xml><?xml version="1.0" encoding="utf-8"?>
+<file path=ppt/slides/slide23.xml><?xml version="1.0" encoding="utf-8"?>
 <p:sld xmlns:a="http://schemas.openxmlformats.org/drawingml/2006/main" xmlns:r="http://schemas.openxmlformats.org/officeDocument/2006/relationships" xmlns:mc="http://schemas.openxmlformats.org/markup-compatibility/2006" xmlns:mv="urn:schemas-microsoft-com:mac:vml" xmlns:p="http://schemas.openxmlformats.org/presentationml/2006/main" xmlns:c="http://schemas.openxmlformats.org/drawingml/2006/chart" xmlns:dgm="http://schemas.openxmlformats.org/drawingml/2006/diagram" xmlns:o="urn:schemas-microsoft-com:office:office" xmlns:v="urn:schemas-microsoft-com:vml" xmlns:pvml="urn:schemas-microsoft-com:office:powerpoint" xmlns:com="http://schemas.openxmlformats.org/drawingml/2006/compatibility" xmlns:p14="http://schemas.microsoft.com/office/powerpoint/2010/main" xmlns:p15="http://schemas.microsoft.com/office/powerpoint/2012/main" xmlns:ahyp="http://schemas.microsoft.com/office/drawing/2018/hyperlinkcolor">
   <p:cSld>
     <p:bg>
@@ -25705,7 +26866,7 @@
     </p:bg>
     <p:spTree>
       <p:nvGrpSpPr>
-        <p:cNvPr id="448" name="Shape 448"/>
+        <p:cNvPr id="467" name="Shape 467"/>
         <p:cNvGrpSpPr/>
         <p:nvPr/>
       </p:nvGrpSpPr>
@@ -25719,7 +26880,7 @@
       </p:grpSpPr>
       <p:sp>
         <p:nvSpPr>
-          <p:cNvPr id="449" name="Google Shape;449;p34"/>
+          <p:cNvPr id="468" name="Google Shape;468;p35"/>
           <p:cNvSpPr/>
           <p:nvPr/>
         </p:nvSpPr>
@@ -25795,7 +26956,7 @@
       </p:sp>
       <p:sp>
         <p:nvSpPr>
-          <p:cNvPr id="450" name="Google Shape;450;p34"/>
+          <p:cNvPr id="469" name="Google Shape;469;p35"/>
           <p:cNvSpPr/>
           <p:nvPr/>
         </p:nvSpPr>
@@ -25871,7 +27032,7 @@
       </p:sp>
       <p:sp>
         <p:nvSpPr>
-          <p:cNvPr id="451" name="Google Shape;451;p34"/>
+          <p:cNvPr id="470" name="Google Shape;470;p35"/>
           <p:cNvSpPr/>
           <p:nvPr/>
         </p:nvSpPr>
@@ -25947,7 +27108,7 @@
       </p:sp>
       <p:sp>
         <p:nvSpPr>
-          <p:cNvPr id="452" name="Google Shape;452;p34"/>
+          <p:cNvPr id="471" name="Google Shape;471;p35"/>
           <p:cNvSpPr txBox="1"/>
           <p:nvPr/>
         </p:nvSpPr>
@@ -32098,6 +33259,285 @@
 </file>
 
 <file path=ppt/theme/theme1.xml><?xml version="1.0" encoding="utf-8"?>
+<a:theme xmlns:a="http://schemas.openxmlformats.org/drawingml/2006/main" xmlns:r="http://schemas.openxmlformats.org/officeDocument/2006/relationships" name="Office Theme">
+  <a:themeElements>
+    <a:clrScheme name="Office">
+      <a:dk1>
+        <a:srgbClr val="000000"/>
+      </a:dk1>
+      <a:lt1>
+        <a:srgbClr val="FFFFFF"/>
+      </a:lt1>
+      <a:dk2>
+        <a:srgbClr val="1F497D"/>
+      </a:dk2>
+      <a:lt2>
+        <a:srgbClr val="EEECE1"/>
+      </a:lt2>
+      <a:accent1>
+        <a:srgbClr val="4F81BD"/>
+      </a:accent1>
+      <a:accent2>
+        <a:srgbClr val="C0504D"/>
+      </a:accent2>
+      <a:accent3>
+        <a:srgbClr val="9BBB59"/>
+      </a:accent3>
+      <a:accent4>
+        <a:srgbClr val="8064A2"/>
+      </a:accent4>
+      <a:accent5>
+        <a:srgbClr val="4BACC6"/>
+      </a:accent5>
+      <a:accent6>
+        <a:srgbClr val="F79646"/>
+      </a:accent6>
+      <a:hlink>
+        <a:srgbClr val="0000FF"/>
+      </a:hlink>
+      <a:folHlink>
+        <a:srgbClr val="800080"/>
+      </a:folHlink>
+    </a:clrScheme>
+    <a:fontScheme name="Office">
+      <a:majorFont>
+        <a:latin typeface="Arial"/>
+        <a:ea typeface=""/>
+        <a:cs typeface=""/>
+        <a:font script="Jpan" typeface="ＭＳ Ｐゴシック"/>
+        <a:font script="Hang" typeface="맑은 고딕"/>
+        <a:font script="Hans" typeface="宋体"/>
+        <a:font script="Hant" typeface="新細明體"/>
+        <a:font script="Arab" typeface="Times New Roman"/>
+        <a:font script="Hebr" typeface="Times New Roman"/>
+        <a:font script="Thai" typeface="Angsana New"/>
+        <a:font script="Ethi" typeface="Nyala"/>
+        <a:font script="Beng" typeface="Vrinda"/>
+        <a:font script="Gujr" typeface="Shruti"/>
+        <a:font script="Khmr" typeface="MoolBoran"/>
+        <a:font script="Knda" typeface="Tunga"/>
+        <a:font script="Guru" typeface="Raavi"/>
+        <a:font script="Cans" typeface="Euphemia"/>
+        <a:font script="Cher" typeface="Plantagenet Cherokee"/>
+        <a:font script="Yiii" typeface="Microsoft Yi Baiti"/>
+        <a:font script="Tibt" typeface="Microsoft Himalaya"/>
+        <a:font script="Thaa" typeface="MV Boli"/>
+        <a:font script="Deva" typeface="Mangal"/>
+        <a:font script="Telu" typeface="Gautami"/>
+        <a:font script="Taml" typeface="Latha"/>
+        <a:font script="Syrc" typeface="Estrangelo Edessa"/>
+        <a:font script="Orya" typeface="Kalinga"/>
+        <a:font script="Mlym" typeface="Kartika"/>
+        <a:font script="Laoo" typeface="DokChampa"/>
+        <a:font script="Sinh" typeface="Iskoola Pota"/>
+        <a:font script="Mong" typeface="Mongolian Baiti"/>
+        <a:font script="Viet" typeface="Times New Roman"/>
+        <a:font script="Uigh" typeface="Microsoft Uighur"/>
+        <a:font script="Geor" typeface="Sylfaen"/>
+      </a:majorFont>
+      <a:minorFont>
+        <a:latin typeface="Arial"/>
+        <a:ea typeface=""/>
+        <a:cs typeface=""/>
+        <a:font script="Jpan" typeface="ＭＳ Ｐゴシック"/>
+        <a:font script="Hang" typeface="맑은 고딕"/>
+        <a:font script="Hans" typeface="宋体"/>
+        <a:font script="Hant" typeface="新細明體"/>
+        <a:font script="Arab" typeface="Arial"/>
+        <a:font script="Hebr" typeface="Arial"/>
+        <a:font script="Thai" typeface="Cordia New"/>
+        <a:font script="Ethi" typeface="Nyala"/>
+        <a:font script="Beng" typeface="Vrinda"/>
+        <a:font script="Gujr" typeface="Shruti"/>
+        <a:font script="Khmr" typeface="DaunPenh"/>
+        <a:font script="Knda" typeface="Tunga"/>
+        <a:font script="Guru" typeface="Raavi"/>
+        <a:font script="Cans" typeface="Euphemia"/>
+        <a:font script="Cher" typeface="Plantagenet Cherokee"/>
+        <a:font script="Yiii" typeface="Microsoft Yi Baiti"/>
+        <a:font script="Tibt" typeface="Microsoft Himalaya"/>
+        <a:font script="Thaa" typeface="MV Boli"/>
+        <a:font script="Deva" typeface="Mangal"/>
+        <a:font script="Telu" typeface="Gautami"/>
+        <a:font script="Taml" typeface="Latha"/>
+        <a:font script="Syrc" typeface="Estrangelo Edessa"/>
+        <a:font script="Orya" typeface="Kalinga"/>
+        <a:font script="Mlym" typeface="Kartika"/>
+        <a:font script="Laoo" typeface="DokChampa"/>
+        <a:font script="Sinh" typeface="Iskoola Pota"/>
+        <a:font script="Mong" typeface="Mongolian Baiti"/>
+        <a:font script="Viet" typeface="Arial"/>
+        <a:font script="Uigh" typeface="Microsoft Uighur"/>
+        <a:font script="Geor" typeface="Sylfaen"/>
+      </a:minorFont>
+    </a:fontScheme>
+    <a:fmtScheme name="Office">
+      <a:fillStyleLst>
+        <a:solidFill>
+          <a:schemeClr val="phClr"/>
+        </a:solidFill>
+        <a:gradFill rotWithShape="1">
+          <a:gsLst>
+            <a:gs pos="0">
+              <a:schemeClr val="phClr">
+                <a:tint val="50000"/>
+                <a:satMod val="300000"/>
+              </a:schemeClr>
+            </a:gs>
+            <a:gs pos="35000">
+              <a:schemeClr val="phClr">
+                <a:tint val="37000"/>
+                <a:satMod val="300000"/>
+              </a:schemeClr>
+            </a:gs>
+            <a:gs pos="100000">
+              <a:schemeClr val="phClr">
+                <a:tint val="15000"/>
+                <a:satMod val="350000"/>
+              </a:schemeClr>
+            </a:gs>
+          </a:gsLst>
+          <a:lin ang="16200000" scaled="1"/>
+        </a:gradFill>
+        <a:gradFill rotWithShape="1">
+          <a:gsLst>
+            <a:gs pos="0">
+              <a:schemeClr val="phClr">
+                <a:tint val="100000"/>
+                <a:shade val="100000"/>
+                <a:satMod val="130000"/>
+              </a:schemeClr>
+            </a:gs>
+            <a:gs pos="100000">
+              <a:schemeClr val="phClr">
+                <a:tint val="50000"/>
+                <a:shade val="100000"/>
+                <a:satMod val="350000"/>
+              </a:schemeClr>
+            </a:gs>
+          </a:gsLst>
+          <a:lin ang="16200000" scaled="0"/>
+        </a:gradFill>
+      </a:fillStyleLst>
+      <a:lnStyleLst>
+        <a:ln w="9525" cap="flat" cmpd="sng" algn="ctr">
+          <a:solidFill>
+            <a:schemeClr val="phClr">
+              <a:shade val="95000"/>
+              <a:satMod val="105000"/>
+            </a:schemeClr>
+          </a:solidFill>
+          <a:prstDash val="solid"/>
+        </a:ln>
+        <a:ln w="25400" cap="flat" cmpd="sng" algn="ctr">
+          <a:solidFill>
+            <a:schemeClr val="phClr"/>
+          </a:solidFill>
+          <a:prstDash val="solid"/>
+        </a:ln>
+        <a:ln w="38100" cap="flat" cmpd="sng" algn="ctr">
+          <a:solidFill>
+            <a:schemeClr val="phClr"/>
+          </a:solidFill>
+          <a:prstDash val="solid"/>
+        </a:ln>
+      </a:lnStyleLst>
+      <a:effectStyleLst>
+        <a:effectStyle>
+          <a:effectLst>
+            <a:outerShdw blurRad="40000" dist="20000" dir="5400000" rotWithShape="0">
+              <a:srgbClr val="000000">
+                <a:alpha val="38000"/>
+              </a:srgbClr>
+            </a:outerShdw>
+          </a:effectLst>
+        </a:effectStyle>
+        <a:effectStyle>
+          <a:effectLst>
+            <a:outerShdw blurRad="40000" dist="23000" dir="5400000" rotWithShape="0">
+              <a:srgbClr val="000000">
+                <a:alpha val="35000"/>
+              </a:srgbClr>
+            </a:outerShdw>
+          </a:effectLst>
+        </a:effectStyle>
+        <a:effectStyle>
+          <a:effectLst>
+            <a:outerShdw blurRad="40000" dist="23000" dir="5400000" rotWithShape="0">
+              <a:srgbClr val="000000">
+                <a:alpha val="35000"/>
+              </a:srgbClr>
+            </a:outerShdw>
+          </a:effectLst>
+          <a:scene3d>
+            <a:camera prst="orthographicFront">
+              <a:rot lat="0" lon="0" rev="0"/>
+            </a:camera>
+            <a:lightRig rig="threePt" dir="t">
+              <a:rot lat="0" lon="0" rev="1200000"/>
+            </a:lightRig>
+          </a:scene3d>
+          <a:sp3d>
+            <a:bevelT w="63500" h="25400"/>
+          </a:sp3d>
+        </a:effectStyle>
+      </a:effectStyleLst>
+      <a:bgFillStyleLst>
+        <a:solidFill>
+          <a:schemeClr val="phClr"/>
+        </a:solidFill>
+        <a:gradFill rotWithShape="1">
+          <a:gsLst>
+            <a:gs pos="0">
+              <a:schemeClr val="phClr">
+                <a:tint val="40000"/>
+                <a:satMod val="350000"/>
+              </a:schemeClr>
+            </a:gs>
+            <a:gs pos="40000">
+              <a:schemeClr val="phClr">
+                <a:tint val="45000"/>
+                <a:shade val="99000"/>
+                <a:satMod val="350000"/>
+              </a:schemeClr>
+            </a:gs>
+            <a:gs pos="100000">
+              <a:schemeClr val="phClr">
+                <a:shade val="20000"/>
+                <a:satMod val="255000"/>
+              </a:schemeClr>
+            </a:gs>
+          </a:gsLst>
+          <a:path path="circle">
+            <a:fillToRect l="50000" t="-80000" r="50000" b="180000"/>
+          </a:path>
+        </a:gradFill>
+        <a:gradFill rotWithShape="1">
+          <a:gsLst>
+            <a:gs pos="0">
+              <a:schemeClr val="phClr">
+                <a:tint val="80000"/>
+                <a:satMod val="300000"/>
+              </a:schemeClr>
+            </a:gs>
+            <a:gs pos="100000">
+              <a:schemeClr val="phClr">
+                <a:shade val="30000"/>
+                <a:satMod val="200000"/>
+              </a:schemeClr>
+            </a:gs>
+          </a:gsLst>
+          <a:path path="circle">
+            <a:fillToRect l="50000" t="50000" r="50000" b="50000"/>
+          </a:path>
+        </a:gradFill>
+      </a:bgFillStyleLst>
+    </a:fmtScheme>
+  </a:themeElements>
+</a:theme>
+</file>
+
+<file path=ppt/theme/theme2.xml><?xml version="1.0" encoding="utf-8"?>
 <a:theme xmlns:a="http://schemas.openxmlformats.org/drawingml/2006/main" xmlns:r="http://schemas.openxmlformats.org/officeDocument/2006/relationships">
   <a:themeElements>
     <a:clrScheme name="Default">
@@ -32374,283 +33814,4 @@
     </a:fmtScheme>
   </a:themeElements>
 </a:theme>
-</file>
-
-<file path=ppt/theme/theme2.xml><?xml version="1.0" encoding="utf-8"?>
-<a:theme xmlns:a="http://schemas.openxmlformats.org/drawingml/2006/main" xmlns:r="http://schemas.openxmlformats.org/officeDocument/2006/relationships" name="Office Theme">
-  <a:themeElements>
-    <a:clrScheme name="Office">
-      <a:dk1>
-        <a:srgbClr val="000000"/>
-      </a:dk1>
-      <a:lt1>
-        <a:srgbClr val="FFFFFF"/>
-      </a:lt1>
-      <a:dk2>
-        <a:srgbClr val="1F497D"/>
-      </a:dk2>
-      <a:lt2>
-        <a:srgbClr val="EEECE1"/>
-      </a:lt2>
-      <a:accent1>
-        <a:srgbClr val="4F81BD"/>
-      </a:accent1>
-      <a:accent2>
-        <a:srgbClr val="C0504D"/>
-      </a:accent2>
-      <a:accent3>
-        <a:srgbClr val="9BBB59"/>
-      </a:accent3>
-      <a:accent4>
-        <a:srgbClr val="8064A2"/>
-      </a:accent4>
-      <a:accent5>
-        <a:srgbClr val="4BACC6"/>
-      </a:accent5>
-      <a:accent6>
-        <a:srgbClr val="F79646"/>
-      </a:accent6>
-      <a:hlink>
-        <a:srgbClr val="0000FF"/>
-      </a:hlink>
-      <a:folHlink>
-        <a:srgbClr val="800080"/>
-      </a:folHlink>
-    </a:clrScheme>
-    <a:fontScheme name="Office">
-      <a:majorFont>
-        <a:latin typeface="Arial"/>
-        <a:ea typeface=""/>
-        <a:cs typeface=""/>
-        <a:font script="Jpan" typeface="ＭＳ Ｐゴシック"/>
-        <a:font script="Hang" typeface="맑은 고딕"/>
-        <a:font script="Hans" typeface="宋体"/>
-        <a:font script="Hant" typeface="新細明體"/>
-        <a:font script="Arab" typeface="Times New Roman"/>
-        <a:font script="Hebr" typeface="Times New Roman"/>
-        <a:font script="Thai" typeface="Angsana New"/>
-        <a:font script="Ethi" typeface="Nyala"/>
-        <a:font script="Beng" typeface="Vrinda"/>
-        <a:font script="Gujr" typeface="Shruti"/>
-        <a:font script="Khmr" typeface="MoolBoran"/>
-        <a:font script="Knda" typeface="Tunga"/>
-        <a:font script="Guru" typeface="Raavi"/>
-        <a:font script="Cans" typeface="Euphemia"/>
-        <a:font script="Cher" typeface="Plantagenet Cherokee"/>
-        <a:font script="Yiii" typeface="Microsoft Yi Baiti"/>
-        <a:font script="Tibt" typeface="Microsoft Himalaya"/>
-        <a:font script="Thaa" typeface="MV Boli"/>
-        <a:font script="Deva" typeface="Mangal"/>
-        <a:font script="Telu" typeface="Gautami"/>
-        <a:font script="Taml" typeface="Latha"/>
-        <a:font script="Syrc" typeface="Estrangelo Edessa"/>
-        <a:font script="Orya" typeface="Kalinga"/>
-        <a:font script="Mlym" typeface="Kartika"/>
-        <a:font script="Laoo" typeface="DokChampa"/>
-        <a:font script="Sinh" typeface="Iskoola Pota"/>
-        <a:font script="Mong" typeface="Mongolian Baiti"/>
-        <a:font script="Viet" typeface="Times New Roman"/>
-        <a:font script="Uigh" typeface="Microsoft Uighur"/>
-        <a:font script="Geor" typeface="Sylfaen"/>
-      </a:majorFont>
-      <a:minorFont>
-        <a:latin typeface="Arial"/>
-        <a:ea typeface=""/>
-        <a:cs typeface=""/>
-        <a:font script="Jpan" typeface="ＭＳ Ｐゴシック"/>
-        <a:font script="Hang" typeface="맑은 고딕"/>
-        <a:font script="Hans" typeface="宋体"/>
-        <a:font script="Hant" typeface="新細明體"/>
-        <a:font script="Arab" typeface="Arial"/>
-        <a:font script="Hebr" typeface="Arial"/>
-        <a:font script="Thai" typeface="Cordia New"/>
-        <a:font script="Ethi" typeface="Nyala"/>
-        <a:font script="Beng" typeface="Vrinda"/>
-        <a:font script="Gujr" typeface="Shruti"/>
-        <a:font script="Khmr" typeface="DaunPenh"/>
-        <a:font script="Knda" typeface="Tunga"/>
-        <a:font script="Guru" typeface="Raavi"/>
-        <a:font script="Cans" typeface="Euphemia"/>
-        <a:font script="Cher" typeface="Plantagenet Cherokee"/>
-        <a:font script="Yiii" typeface="Microsoft Yi Baiti"/>
-        <a:font script="Tibt" typeface="Microsoft Himalaya"/>
-        <a:font script="Thaa" typeface="MV Boli"/>
-        <a:font script="Deva" typeface="Mangal"/>
-        <a:font script="Telu" typeface="Gautami"/>
-        <a:font script="Taml" typeface="Latha"/>
-        <a:font script="Syrc" typeface="Estrangelo Edessa"/>
-        <a:font script="Orya" typeface="Kalinga"/>
-        <a:font script="Mlym" typeface="Kartika"/>
-        <a:font script="Laoo" typeface="DokChampa"/>
-        <a:font script="Sinh" typeface="Iskoola Pota"/>
-        <a:font script="Mong" typeface="Mongolian Baiti"/>
-        <a:font script="Viet" typeface="Arial"/>
-        <a:font script="Uigh" typeface="Microsoft Uighur"/>
-        <a:font script="Geor" typeface="Sylfaen"/>
-      </a:minorFont>
-    </a:fontScheme>
-    <a:fmtScheme name="Office">
-      <a:fillStyleLst>
-        <a:solidFill>
-          <a:schemeClr val="phClr"/>
-        </a:solidFill>
-        <a:gradFill rotWithShape="1">
-          <a:gsLst>
-            <a:gs pos="0">
-              <a:schemeClr val="phClr">
-                <a:tint val="50000"/>
-                <a:satMod val="300000"/>
-              </a:schemeClr>
-            </a:gs>
-            <a:gs pos="35000">
-              <a:schemeClr val="phClr">
-                <a:tint val="37000"/>
-                <a:satMod val="300000"/>
-              </a:schemeClr>
-            </a:gs>
-            <a:gs pos="100000">
-              <a:schemeClr val="phClr">
-                <a:tint val="15000"/>
-                <a:satMod val="350000"/>
-              </a:schemeClr>
-            </a:gs>
-          </a:gsLst>
-          <a:lin ang="16200000" scaled="1"/>
-        </a:gradFill>
-        <a:gradFill rotWithShape="1">
-          <a:gsLst>
-            <a:gs pos="0">
-              <a:schemeClr val="phClr">
-                <a:tint val="100000"/>
-                <a:shade val="100000"/>
-                <a:satMod val="130000"/>
-              </a:schemeClr>
-            </a:gs>
-            <a:gs pos="100000">
-              <a:schemeClr val="phClr">
-                <a:tint val="50000"/>
-                <a:shade val="100000"/>
-                <a:satMod val="350000"/>
-              </a:schemeClr>
-            </a:gs>
-          </a:gsLst>
-          <a:lin ang="16200000" scaled="0"/>
-        </a:gradFill>
-      </a:fillStyleLst>
-      <a:lnStyleLst>
-        <a:ln w="9525" cap="flat" cmpd="sng" algn="ctr">
-          <a:solidFill>
-            <a:schemeClr val="phClr">
-              <a:shade val="95000"/>
-              <a:satMod val="105000"/>
-            </a:schemeClr>
-          </a:solidFill>
-          <a:prstDash val="solid"/>
-        </a:ln>
-        <a:ln w="25400" cap="flat" cmpd="sng" algn="ctr">
-          <a:solidFill>
-            <a:schemeClr val="phClr"/>
-          </a:solidFill>
-          <a:prstDash val="solid"/>
-        </a:ln>
-        <a:ln w="38100" cap="flat" cmpd="sng" algn="ctr">
-          <a:solidFill>
-            <a:schemeClr val="phClr"/>
-          </a:solidFill>
-          <a:prstDash val="solid"/>
-        </a:ln>
-      </a:lnStyleLst>
-      <a:effectStyleLst>
-        <a:effectStyle>
-          <a:effectLst>
-            <a:outerShdw blurRad="40000" dist="20000" dir="5400000" rotWithShape="0">
-              <a:srgbClr val="000000">
-                <a:alpha val="38000"/>
-              </a:srgbClr>
-            </a:outerShdw>
-          </a:effectLst>
-        </a:effectStyle>
-        <a:effectStyle>
-          <a:effectLst>
-            <a:outerShdw blurRad="40000" dist="23000" dir="5400000" rotWithShape="0">
-              <a:srgbClr val="000000">
-                <a:alpha val="35000"/>
-              </a:srgbClr>
-            </a:outerShdw>
-          </a:effectLst>
-        </a:effectStyle>
-        <a:effectStyle>
-          <a:effectLst>
-            <a:outerShdw blurRad="40000" dist="23000" dir="5400000" rotWithShape="0">
-              <a:srgbClr val="000000">
-                <a:alpha val="35000"/>
-              </a:srgbClr>
-            </a:outerShdw>
-          </a:effectLst>
-          <a:scene3d>
-            <a:camera prst="orthographicFront">
-              <a:rot lat="0" lon="0" rev="0"/>
-            </a:camera>
-            <a:lightRig rig="threePt" dir="t">
-              <a:rot lat="0" lon="0" rev="1200000"/>
-            </a:lightRig>
-          </a:scene3d>
-          <a:sp3d>
-            <a:bevelT w="63500" h="25400"/>
-          </a:sp3d>
-        </a:effectStyle>
-      </a:effectStyleLst>
-      <a:bgFillStyleLst>
-        <a:solidFill>
-          <a:schemeClr val="phClr"/>
-        </a:solidFill>
-        <a:gradFill rotWithShape="1">
-          <a:gsLst>
-            <a:gs pos="0">
-              <a:schemeClr val="phClr">
-                <a:tint val="40000"/>
-                <a:satMod val="350000"/>
-              </a:schemeClr>
-            </a:gs>
-            <a:gs pos="40000">
-              <a:schemeClr val="phClr">
-                <a:tint val="45000"/>
-                <a:shade val="99000"/>
-                <a:satMod val="350000"/>
-              </a:schemeClr>
-            </a:gs>
-            <a:gs pos="100000">
-              <a:schemeClr val="phClr">
-                <a:shade val="20000"/>
-                <a:satMod val="255000"/>
-              </a:schemeClr>
-            </a:gs>
-          </a:gsLst>
-          <a:path path="circle">
-            <a:fillToRect l="50000" t="-80000" r="50000" b="180000"/>
-          </a:path>
-        </a:gradFill>
-        <a:gradFill rotWithShape="1">
-          <a:gsLst>
-            <a:gs pos="0">
-              <a:schemeClr val="phClr">
-                <a:tint val="80000"/>
-                <a:satMod val="300000"/>
-              </a:schemeClr>
-            </a:gs>
-            <a:gs pos="100000">
-              <a:schemeClr val="phClr">
-                <a:shade val="30000"/>
-                <a:satMod val="200000"/>
-              </a:schemeClr>
-            </a:gs>
-          </a:gsLst>
-          <a:path path="circle">
-            <a:fillToRect l="50000" t="50000" r="50000" b="50000"/>
-          </a:path>
-        </a:gradFill>
-      </a:bgFillStyleLst>
-    </a:fmtScheme>
-  </a:themeElements>
-</a:theme>
 </file>
</xml_diff>